<commit_message>
create new approval api url
</commit_message>
<xml_diff>
--- a/cronjob_flow.pptx
+++ b/cronjob_flow.pptx
@@ -6,6 +6,7 @@
   </p:sldMasterIdLst>
   <p:sldIdLst>
     <p:sldId id="256" r:id="rId2"/>
+    <p:sldId id="257" r:id="rId3"/>
   </p:sldIdLst>
   <p:sldSz cx="12192000" cy="6858000"/>
   <p:notesSz cx="6858000" cy="9144000"/>
@@ -3362,8 +3363,8 @@
           <a:p>
             <a:pPr algn="ctr"/>
             <a:r>
-              <a:rPr lang="en-US" dirty="0"/>
-              <a:t>Apply new account</a:t>
+              <a:rPr lang="en-US" sz="1600" dirty="0"/>
+              <a:t>User apply an account</a:t>
             </a:r>
           </a:p>
         </p:txBody>
@@ -3545,8 +3546,8 @@
         </p:nvSpPr>
         <p:spPr>
           <a:xfrm>
-            <a:off x="7387497" y="746093"/>
-            <a:ext cx="2436125" cy="630620"/>
+            <a:off x="7412211" y="746093"/>
+            <a:ext cx="2757401" cy="630620"/>
           </a:xfrm>
           <a:prstGeom prst="rect">
             <a:avLst/>
@@ -3604,8 +3605,8 @@
         </p:nvSpPr>
         <p:spPr>
           <a:xfrm>
-            <a:off x="7399855" y="1874677"/>
-            <a:ext cx="2596762" cy="630620"/>
+            <a:off x="7399854" y="1787682"/>
+            <a:ext cx="2776111" cy="387816"/>
           </a:xfrm>
           <a:prstGeom prst="rect">
             <a:avLst/>
@@ -3638,15 +3639,7 @@
             <a:pPr algn="ctr"/>
             <a:r>
               <a:rPr lang="en-US" sz="1200" dirty="0"/>
-              <a:t>Cronjob: </a:t>
-            </a:r>
-            <a:r>
-              <a:rPr lang="en-US" sz="1200" dirty="0" err="1"/>
-              <a:t>manage_accounts</a:t>
-            </a:r>
-            <a:r>
-              <a:rPr lang="en-US" sz="1200" dirty="0"/>
-              <a:t>() will check pending account; if found trigger notification email</a:t>
+              <a:t>Cronjob run hourly</a:t>
             </a:r>
           </a:p>
         </p:txBody>
@@ -3665,8 +3658,8 @@
         </p:nvSpPr>
         <p:spPr>
           <a:xfrm>
-            <a:off x="7387498" y="3167592"/>
-            <a:ext cx="2609120" cy="1597004"/>
+            <a:off x="7412211" y="3459892"/>
+            <a:ext cx="2769759" cy="1749548"/>
           </a:xfrm>
           <a:prstGeom prst="rect">
             <a:avLst/>
@@ -3804,8 +3797,61 @@
         </p:nvSpPr>
         <p:spPr>
           <a:xfrm>
-            <a:off x="4513344" y="5796597"/>
+            <a:off x="10442032" y="5721856"/>
             <a:ext cx="1458238" cy="630620"/>
+          </a:xfrm>
+          <a:prstGeom prst="rect">
+            <a:avLst/>
+          </a:prstGeom>
+          <a:solidFill>
+            <a:schemeClr val="tx2">
+              <a:lumMod val="25000"/>
+              <a:lumOff val="75000"/>
+            </a:schemeClr>
+          </a:solidFill>
+        </p:spPr>
+        <p:style>
+          <a:lnRef idx="2">
+            <a:schemeClr val="accent6"/>
+          </a:lnRef>
+          <a:fillRef idx="1">
+            <a:schemeClr val="lt1"/>
+          </a:fillRef>
+          <a:effectRef idx="0">
+            <a:schemeClr val="accent6"/>
+          </a:effectRef>
+          <a:fontRef idx="minor">
+            <a:schemeClr val="dk1"/>
+          </a:fontRef>
+        </p:style>
+        <p:txBody>
+          <a:bodyPr rtlCol="0" anchor="ctr"/>
+          <a:lstStyle/>
+          <a:p>
+            <a:pPr algn="ctr"/>
+            <a:r>
+              <a:rPr lang="en-US" sz="1200" dirty="0"/>
+              <a:t>Send email about approve or not </a:t>
+            </a:r>
+          </a:p>
+        </p:txBody>
+      </p:sp>
+      <p:sp>
+        <p:nvSpPr>
+          <p:cNvPr id="19" name="Rectangle 18">
+            <a:extLst>
+              <a:ext uri="{FF2B5EF4-FFF2-40B4-BE49-F238E27FC236}">
+                <a16:creationId xmlns:a16="http://schemas.microsoft.com/office/drawing/2014/main" id="{FFA5FC3C-92F9-36BF-D571-7E1F85BA51B5}"/>
+              </a:ext>
+            </a:extLst>
+          </p:cNvPr>
+          <p:cNvSpPr/>
+          <p:nvPr/>
+        </p:nvSpPr>
+        <p:spPr>
+          <a:xfrm>
+            <a:off x="3944082" y="3459893"/>
+            <a:ext cx="3022715" cy="1749547"/>
           </a:xfrm>
           <a:prstGeom prst="rect">
             <a:avLst/>
@@ -3829,28 +3875,204 @@
           <a:bodyPr rtlCol="0" anchor="ctr"/>
           <a:lstStyle/>
           <a:p>
-            <a:pPr algn="ctr"/>
-            <a:r>
-              <a:rPr lang="en-US" sz="1200" dirty="0"/>
-              <a:t>Update </a:t>
-            </a:r>
-            <a:r>
-              <a:rPr lang="en-US" sz="1200" dirty="0" err="1"/>
-              <a:t>auth_user_groups</a:t>
-            </a:r>
-            <a:r>
-              <a:rPr lang="en-US" sz="1200" dirty="0"/>
-              <a:t> if approve or not</a:t>
-            </a:r>
-          </a:p>
-        </p:txBody>
-      </p:sp>
-      <p:sp>
-        <p:nvSpPr>
-          <p:cNvPr id="18" name="Rectangle 17">
-            <a:extLst>
-              <a:ext uri="{FF2B5EF4-FFF2-40B4-BE49-F238E27FC236}">
-                <a16:creationId xmlns:a16="http://schemas.microsoft.com/office/drawing/2014/main" id="{CBB6ABC9-8FBE-E48A-EB54-8B1B0241D508}"/>
+            <a:pPr algn="l">
+              <a:buFont typeface="Arial" panose="020B0604020202020204" pitchFamily="34" charset="0"/>
+              <a:buChar char="•"/>
+            </a:pPr>
+            <a:r>
+              <a:rPr lang="en-US" sz="800" b="0" i="0" u="none" strike="noStrike" dirty="0">
+                <a:solidFill>
+                  <a:srgbClr val="212121"/>
+                </a:solidFill>
+                <a:effectLst/>
+                <a:latin typeface="Aptos" panose="020B0004020202020204" pitchFamily="34" charset="0"/>
+              </a:rPr>
+              <a:t>Dear </a:t>
+            </a:r>
+            <a:r>
+              <a:rPr lang="en-US" sz="800" b="0" i="0" dirty="0">
+                <a:solidFill>
+                  <a:srgbClr val="0078D7"/>
+                </a:solidFill>
+                <a:effectLst/>
+                <a:latin typeface="Aptos" panose="020B0004020202020204" pitchFamily="34" charset="0"/>
+                <a:hlinkClick r:id="rId3"/>
+              </a:rPr>
+              <a:t>xiaozheng.yao@nih.gov</a:t>
+            </a:r>
+            <a:r>
+              <a:rPr lang="en-US" sz="800" b="0" i="0" u="none" strike="noStrike" dirty="0">
+                <a:solidFill>
+                  <a:srgbClr val="212121"/>
+                </a:solidFill>
+                <a:effectLst/>
+                <a:latin typeface="Aptos" panose="020B0004020202020204" pitchFamily="34" charset="0"/>
+              </a:rPr>
+              <a:t>,</a:t>
+            </a:r>
+            <a:br>
+              <a:rPr lang="en-US" sz="800" dirty="0"/>
+            </a:br>
+            <a:r>
+              <a:rPr lang="en-US" sz="800" b="0" i="0" u="none" strike="noStrike" dirty="0">
+                <a:solidFill>
+                  <a:srgbClr val="212121"/>
+                </a:solidFill>
+                <a:effectLst/>
+                <a:latin typeface="Aptos" panose="020B0004020202020204" pitchFamily="34" charset="0"/>
+              </a:rPr>
+              <a:t>Your CTB account shows that you had no activity for a long time, and will expire on 2024-07-26 (1 days from today).</a:t>
+            </a:r>
+            <a:br>
+              <a:rPr lang="en-US" sz="800" dirty="0"/>
+            </a:br>
+            <a:r>
+              <a:rPr lang="en-US" sz="800" b="0" i="0" u="none" strike="noStrike" dirty="0">
+                <a:solidFill>
+                  <a:srgbClr val="212121"/>
+                </a:solidFill>
+                <a:effectLst/>
+                <a:latin typeface="Aptos" panose="020B0004020202020204" pitchFamily="34" charset="0"/>
+              </a:rPr>
+              <a:t>Please visit </a:t>
+            </a:r>
+            <a:r>
+              <a:rPr lang="en-US" sz="800" b="0" i="0" dirty="0">
+                <a:solidFill>
+                  <a:srgbClr val="0078D7"/>
+                </a:solidFill>
+                <a:effectLst/>
+                <a:latin typeface="Aptos" panose="020B0004020202020204" pitchFamily="34" charset="0"/>
+                <a:hlinkClick r:id="rId4" tooltip="https://chernobyltissuebank-dev.cancer.gov/accounts/login/"/>
+              </a:rPr>
+              <a:t>our website</a:t>
+            </a:r>
+            <a:r>
+              <a:rPr lang="en-US" sz="800" b="0" i="0" u="none" strike="noStrike" dirty="0">
+                <a:solidFill>
+                  <a:srgbClr val="212121"/>
+                </a:solidFill>
+                <a:effectLst/>
+                <a:latin typeface="Aptos" panose="020B0004020202020204" pitchFamily="34" charset="0"/>
+              </a:rPr>
+              <a:t> and login to your account before it expires, to ensure uninterrupted access.</a:t>
+            </a:r>
+            <a:br>
+              <a:rPr lang="en-US" sz="800" dirty="0"/>
+            </a:br>
+            <a:r>
+              <a:rPr lang="en-US" sz="800" b="0" i="0" u="none" strike="noStrike" dirty="0">
+                <a:solidFill>
+                  <a:srgbClr val="212121"/>
+                </a:solidFill>
+                <a:effectLst/>
+                <a:latin typeface="Aptos" panose="020B0004020202020204" pitchFamily="34" charset="0"/>
+              </a:rPr>
+              <a:t>Any account that has not been logged in for 60 days or longer will become deactivated, but any stored information with the account will not be lost.</a:t>
+            </a:r>
+            <a:br>
+              <a:rPr lang="en-US" sz="800" dirty="0"/>
+            </a:br>
+            <a:r>
+              <a:rPr lang="en-US" sz="800" b="0" i="0" u="none" strike="noStrike" dirty="0">
+                <a:solidFill>
+                  <a:srgbClr val="212121"/>
+                </a:solidFill>
+                <a:effectLst/>
+                <a:latin typeface="Aptos" panose="020B0004020202020204" pitchFamily="34" charset="0"/>
+              </a:rPr>
+              <a:t>Once the account is deactivated, you will need to contact us to re-</a:t>
+            </a:r>
+            <a:r>
+              <a:rPr lang="en-US" sz="800" b="0" i="0" u="none" strike="noStrike" dirty="0" err="1">
+                <a:solidFill>
+                  <a:srgbClr val="212121"/>
+                </a:solidFill>
+                <a:effectLst/>
+                <a:latin typeface="Aptos" panose="020B0004020202020204" pitchFamily="34" charset="0"/>
+              </a:rPr>
+              <a:t>atviate</a:t>
+            </a:r>
+            <a:r>
+              <a:rPr lang="en-US" sz="800" b="0" i="0" u="none" strike="noStrike" dirty="0">
+                <a:solidFill>
+                  <a:srgbClr val="212121"/>
+                </a:solidFill>
+                <a:effectLst/>
+                <a:latin typeface="Aptos" panose="020B0004020202020204" pitchFamily="34" charset="0"/>
+              </a:rPr>
+              <a:t> your account.</a:t>
+            </a:r>
+            <a:br>
+              <a:rPr lang="en-US" sz="800" dirty="0"/>
+            </a:br>
+            <a:r>
+              <a:rPr lang="en-US" sz="800" b="0" i="0" u="none" strike="noStrike" dirty="0">
+                <a:solidFill>
+                  <a:srgbClr val="212121"/>
+                </a:solidFill>
+                <a:effectLst/>
+                <a:latin typeface="Aptos" panose="020B0004020202020204" pitchFamily="34" charset="0"/>
+              </a:rPr>
+              <a:t>If you need assistance with your login then please email us at </a:t>
+            </a:r>
+            <a:r>
+              <a:rPr lang="en-US" sz="800" b="0" i="0" dirty="0">
+                <a:solidFill>
+                  <a:srgbClr val="0078D7"/>
+                </a:solidFill>
+                <a:effectLst/>
+                <a:latin typeface="Aptos" panose="020B0004020202020204" pitchFamily="34" charset="0"/>
+                <a:hlinkClick r:id="rId5"/>
+              </a:rPr>
+              <a:t>ctbWebAdmin@mail.nih.gov</a:t>
+            </a:r>
+            <a:r>
+              <a:rPr lang="en-US" sz="800" b="0" i="0" u="none" strike="noStrike" dirty="0">
+                <a:solidFill>
+                  <a:srgbClr val="212121"/>
+                </a:solidFill>
+                <a:effectLst/>
+                <a:latin typeface="Aptos" panose="020B0004020202020204" pitchFamily="34" charset="0"/>
+              </a:rPr>
+              <a:t>.</a:t>
+            </a:r>
+            <a:br>
+              <a:rPr lang="en-US" sz="800" dirty="0"/>
+            </a:br>
+            <a:r>
+              <a:rPr lang="en-US" sz="800" b="0" i="0" u="none" strike="noStrike" dirty="0">
+                <a:solidFill>
+                  <a:srgbClr val="212121"/>
+                </a:solidFill>
+                <a:effectLst/>
+                <a:latin typeface="Aptos" panose="020B0004020202020204" pitchFamily="34" charset="0"/>
+              </a:rPr>
+              <a:t>Sincerely,</a:t>
+            </a:r>
+            <a:br>
+              <a:rPr lang="en-US" sz="800" dirty="0"/>
+            </a:br>
+            <a:r>
+              <a:rPr lang="en-US" sz="800" b="0" i="0" u="none" strike="noStrike" dirty="0">
+                <a:solidFill>
+                  <a:srgbClr val="212121"/>
+                </a:solidFill>
+                <a:effectLst/>
+                <a:latin typeface="Aptos" panose="020B0004020202020204" pitchFamily="34" charset="0"/>
+              </a:rPr>
+              <a:t>Chernobyl Tissue Bank Team</a:t>
+            </a:r>
+            <a:endParaRPr lang="en-US" sz="800" dirty="0"/>
+          </a:p>
+        </p:txBody>
+      </p:sp>
+      <p:sp>
+        <p:nvSpPr>
+          <p:cNvPr id="20" name="Rectangle 19">
+            <a:extLst>
+              <a:ext uri="{FF2B5EF4-FFF2-40B4-BE49-F238E27FC236}">
+                <a16:creationId xmlns:a16="http://schemas.microsoft.com/office/drawing/2014/main" id="{6BDDEFC9-0F83-6C1D-C74C-C47218D4E851}"/>
               </a:ext>
             </a:extLst>
           </p:cNvPr>
@@ -3859,69 +4081,8 @@
         </p:nvSpPr>
         <p:spPr>
           <a:xfrm>
-            <a:off x="3944082" y="1874820"/>
-            <a:ext cx="2596762" cy="630620"/>
-          </a:xfrm>
-          <a:prstGeom prst="rect">
-            <a:avLst/>
-          </a:prstGeom>
-          <a:solidFill>
-            <a:schemeClr val="accent2">
-              <a:lumMod val="20000"/>
-              <a:lumOff val="80000"/>
-            </a:schemeClr>
-          </a:solidFill>
-        </p:spPr>
-        <p:style>
-          <a:lnRef idx="2">
-            <a:schemeClr val="accent6"/>
-          </a:lnRef>
-          <a:fillRef idx="1">
-            <a:schemeClr val="lt1"/>
-          </a:fillRef>
-          <a:effectRef idx="0">
-            <a:schemeClr val="accent6"/>
-          </a:effectRef>
-          <a:fontRef idx="minor">
-            <a:schemeClr val="dk1"/>
-          </a:fontRef>
-        </p:style>
-        <p:txBody>
-          <a:bodyPr rtlCol="0" anchor="ctr"/>
-          <a:lstStyle/>
-          <a:p>
-            <a:pPr algn="ctr"/>
-            <a:r>
-              <a:rPr lang="en-US" sz="1200" dirty="0"/>
-              <a:t>Cronjob: </a:t>
-            </a:r>
-            <a:r>
-              <a:rPr lang="en-US" sz="1200" dirty="0" err="1"/>
-              <a:t>manage_accounts</a:t>
-            </a:r>
-            <a:r>
-              <a:rPr lang="en-US" sz="1200" dirty="0"/>
-              <a:t>()</a:t>
-            </a:r>
-          </a:p>
-        </p:txBody>
-      </p:sp>
-      <p:sp>
-        <p:nvSpPr>
-          <p:cNvPr id="19" name="Rectangle 18">
-            <a:extLst>
-              <a:ext uri="{FF2B5EF4-FFF2-40B4-BE49-F238E27FC236}">
-                <a16:creationId xmlns:a16="http://schemas.microsoft.com/office/drawing/2014/main" id="{FFA5FC3C-92F9-36BF-D571-7E1F85BA51B5}"/>
-              </a:ext>
-            </a:extLst>
-          </p:cNvPr>
-          <p:cNvSpPr/>
-          <p:nvPr/>
-        </p:nvSpPr>
-        <p:spPr>
-          <a:xfrm>
-            <a:off x="3944082" y="3167592"/>
-            <a:ext cx="2609120" cy="1597004"/>
+            <a:off x="387751" y="3459892"/>
+            <a:ext cx="3022715" cy="1749548"/>
           </a:xfrm>
           <a:prstGeom prst="rect">
             <a:avLst/>
@@ -3945,10 +4106,7 @@
           <a:bodyPr rtlCol="0" anchor="ctr"/>
           <a:lstStyle/>
           <a:p>
-            <a:pPr algn="l">
-              <a:buFont typeface="Arial" panose="020B0604020202020204" pitchFamily="34" charset="0"/>
-              <a:buChar char="•"/>
-            </a:pPr>
+            <a:pPr algn="l"/>
             <a:r>
               <a:rPr lang="en-US" sz="800" b="0" i="0" u="none" strike="noStrike" dirty="0">
                 <a:solidFill>
@@ -3957,7 +4115,28 @@
                 <a:effectLst/>
                 <a:latin typeface="Aptos" panose="020B0004020202020204" pitchFamily="34" charset="0"/>
               </a:rPr>
-              <a:t>This is an email to inform you that there is 1 new CTB account which is in pending status:</a:t>
+              <a:t>Dear </a:t>
+            </a:r>
+            <a:r>
+              <a:rPr lang="en-US" sz="800" b="0" i="0" dirty="0">
+                <a:solidFill>
+                  <a:srgbClr val="0078D7"/>
+                </a:solidFill>
+                <a:effectLst/>
+                <a:latin typeface="Aptos" panose="020B0004020202020204" pitchFamily="34" charset="0"/>
+                <a:hlinkClick r:id="rId3"/>
+              </a:rPr>
+              <a:t>xiaozheng.yao@nih.gov</a:t>
+            </a:r>
+            <a:r>
+              <a:rPr lang="en-US" sz="800" b="0" i="0" u="none" strike="noStrike" dirty="0">
+                <a:solidFill>
+                  <a:srgbClr val="212121"/>
+                </a:solidFill>
+                <a:effectLst/>
+                <a:latin typeface="Aptos" panose="020B0004020202020204" pitchFamily="34" charset="0"/>
+              </a:rPr>
+              <a:t>,</a:t>
             </a:r>
             <a:br>
               <a:rPr lang="en-US" sz="800" dirty="0"/>
@@ -3970,7 +4149,7 @@
                 <a:effectLst/>
                 <a:latin typeface="Aptos" panose="020B0004020202020204" pitchFamily="34" charset="0"/>
               </a:rPr>
-              <a:t>User account email:</a:t>
+              <a:t>Your CTB account password will expire on 2024-08-09 (14 days from today).</a:t>
             </a:r>
             <a:br>
               <a:rPr lang="en-US" sz="800" dirty="0"/>
@@ -3978,13 +4157,33 @@
             <a:r>
               <a:rPr lang="en-US" sz="800" b="0" i="0" u="none" strike="noStrike" dirty="0">
                 <a:solidFill>
-                  <a:srgbClr val="0078D7"/>
+                  <a:srgbClr val="212121"/>
                 </a:solidFill>
                 <a:effectLst/>
                 <a:latin typeface="Aptos" panose="020B0004020202020204" pitchFamily="34" charset="0"/>
-                <a:hlinkClick r:id="rId2"/>
               </a:rPr>
-              <a:t>xiaoz.yao@gmail.com</a:t>
+              <a:t>Please visit </a:t>
+            </a:r>
+            <a:r>
+              <a:rPr lang="en-US" sz="800" b="0" i="0" dirty="0">
+                <a:solidFill>
+                  <a:srgbClr val="0078D7"/>
+                </a:solidFill>
+                <a:effectLst/>
+                <a:latin typeface="Aptos" panose="020B0004020202020204" pitchFamily="34" charset="0"/>
+                <a:hlinkClick r:id="rId4" tooltip="https://chernobyltissuebank-dev.cancer.gov/accounts/login/"/>
+              </a:rPr>
+              <a:t>our website</a:t>
+            </a:r>
+            <a:r>
+              <a:rPr lang="en-US" sz="800" b="0" i="0" u="none" strike="noStrike" dirty="0">
+                <a:solidFill>
+                  <a:srgbClr val="212121"/>
+                </a:solidFill>
+                <a:effectLst/>
+                <a:latin typeface="Aptos" panose="020B0004020202020204" pitchFamily="34" charset="0"/>
+              </a:rPr>
+              <a:t> to change your password before it expires, to ensure uninterrupted access.</a:t>
             </a:r>
             <a:br>
               <a:rPr lang="en-US" sz="800" dirty="0"/>
@@ -3997,7 +4196,7 @@
                 <a:effectLst/>
                 <a:latin typeface="Aptos" panose="020B0004020202020204" pitchFamily="34" charset="0"/>
               </a:rPr>
-              <a:t>Please evaluate the account above and inform the CTB Web team whether to approve or disapprove it.</a:t>
+              <a:t>To access this webpage you must know your username and current password.</a:t>
             </a:r>
             <a:br>
               <a:rPr lang="en-US" sz="800" dirty="0"/>
@@ -4010,7 +4209,7 @@
                 <a:effectLst/>
                 <a:latin typeface="Aptos" panose="020B0004020202020204" pitchFamily="34" charset="0"/>
               </a:rPr>
-              <a:t>A user will not be able to access the biorepository until the account is approved.</a:t>
+              <a:t>Your new password will expire in 120 days after you change it.</a:t>
             </a:r>
             <a:br>
               <a:rPr lang="en-US" sz="800" dirty="0"/>
@@ -4023,11 +4222,42 @@
                 <a:effectLst/>
                 <a:latin typeface="Aptos" panose="020B0004020202020204" pitchFamily="34" charset="0"/>
               </a:rPr>
-              <a:t>A disapproved account will be deactivated, and cannot be reused again without an admin's assistance.</a:t>
+              <a:t>If you need assistance with your login then please email us at </a:t>
+            </a:r>
+            <a:r>
+              <a:rPr lang="en-US" sz="800" b="0" i="0" dirty="0">
+                <a:solidFill>
+                  <a:srgbClr val="0078D7"/>
+                </a:solidFill>
+                <a:effectLst/>
+                <a:latin typeface="Aptos" panose="020B0004020202020204" pitchFamily="34" charset="0"/>
+                <a:hlinkClick r:id="rId5"/>
+              </a:rPr>
+              <a:t>ctbWebAdmin@mail.nih.gov</a:t>
+            </a:r>
+            <a:r>
+              <a:rPr lang="en-US" sz="800" b="0" i="0" u="none" strike="noStrike" dirty="0">
+                <a:solidFill>
+                  <a:srgbClr val="212121"/>
+                </a:solidFill>
+                <a:effectLst/>
+                <a:latin typeface="Aptos" panose="020B0004020202020204" pitchFamily="34" charset="0"/>
+              </a:rPr>
+              <a:t>.</a:t>
             </a:r>
             <a:br>
               <a:rPr lang="en-US" sz="800" dirty="0"/>
             </a:br>
+            <a:r>
+              <a:rPr lang="en-US" sz="800" b="0" i="0" u="none" strike="noStrike" dirty="0">
+                <a:solidFill>
+                  <a:srgbClr val="212121"/>
+                </a:solidFill>
+                <a:effectLst/>
+                <a:latin typeface="Aptos" panose="020B0004020202020204" pitchFamily="34" charset="0"/>
+              </a:rPr>
+              <a:t>Sincerely,</a:t>
+            </a:r>
             <a:br>
               <a:rPr lang="en-US" sz="800" dirty="0"/>
             </a:br>
@@ -4039,7 +4269,7 @@
                 <a:effectLst/>
                 <a:latin typeface="Aptos" panose="020B0004020202020204" pitchFamily="34" charset="0"/>
               </a:rPr>
-              <a:t>CTB Web Team</a:t>
+              <a:t>Chernobyl Tissue Bank Team</a:t>
             </a:r>
             <a:endParaRPr lang="en-US" sz="800" dirty="0"/>
           </a:p>
@@ -4047,10 +4277,10 @@
       </p:sp>
       <p:sp>
         <p:nvSpPr>
-          <p:cNvPr id="20" name="Rectangle 19">
-            <a:extLst>
-              <a:ext uri="{FF2B5EF4-FFF2-40B4-BE49-F238E27FC236}">
-                <a16:creationId xmlns:a16="http://schemas.microsoft.com/office/drawing/2014/main" id="{6BDDEFC9-0F83-6C1D-C74C-C47218D4E851}"/>
+          <p:cNvPr id="21" name="Rectangle 20">
+            <a:extLst>
+              <a:ext uri="{FF2B5EF4-FFF2-40B4-BE49-F238E27FC236}">
+                <a16:creationId xmlns:a16="http://schemas.microsoft.com/office/drawing/2014/main" id="{9CB710C6-BB75-01AD-41E3-C3C1F69E92B8}"/>
               </a:ext>
             </a:extLst>
           </p:cNvPr>
@@ -4059,8 +4289,80 @@
         </p:nvSpPr>
         <p:spPr>
           <a:xfrm>
-            <a:off x="593906" y="3167592"/>
-            <a:ext cx="2609120" cy="1597004"/>
+            <a:off x="7399854" y="5718233"/>
+            <a:ext cx="2782117" cy="630620"/>
+          </a:xfrm>
+          <a:prstGeom prst="rect">
+            <a:avLst/>
+          </a:prstGeom>
+          <a:solidFill>
+            <a:schemeClr val="tx2">
+              <a:lumMod val="25000"/>
+              <a:lumOff val="75000"/>
+            </a:schemeClr>
+          </a:solidFill>
+        </p:spPr>
+        <p:style>
+          <a:lnRef idx="2">
+            <a:schemeClr val="accent6"/>
+          </a:lnRef>
+          <a:fillRef idx="1">
+            <a:schemeClr val="lt1"/>
+          </a:fillRef>
+          <a:effectRef idx="0">
+            <a:schemeClr val="accent6"/>
+          </a:effectRef>
+          <a:fontRef idx="minor">
+            <a:schemeClr val="dk1"/>
+          </a:fontRef>
+        </p:style>
+        <p:txBody>
+          <a:bodyPr rtlCol="0" anchor="ctr"/>
+          <a:lstStyle/>
+          <a:p>
+            <a:pPr algn="ctr"/>
+            <a:r>
+              <a:rPr lang="en-US" sz="1200" dirty="0"/>
+              <a:t>Admin call account </a:t>
+            </a:r>
+            <a:r>
+              <a:rPr lang="en-US" sz="1200" dirty="0" err="1"/>
+              <a:t>approval_stat</a:t>
+            </a:r>
+            <a:r>
+              <a:rPr lang="en-US" sz="1200" dirty="0"/>
+              <a:t> to approve or not</a:t>
+            </a:r>
+          </a:p>
+          <a:p>
+            <a:pPr algn="ctr"/>
+            <a:r>
+              <a:rPr lang="en-US" sz="1200" dirty="0" err="1"/>
+              <a:t>auth_user_groups</a:t>
+            </a:r>
+            <a:r>
+              <a:rPr lang="en-US" sz="1200" dirty="0"/>
+              <a:t> will be updated</a:t>
+            </a:r>
+          </a:p>
+        </p:txBody>
+      </p:sp>
+      <p:sp>
+        <p:nvSpPr>
+          <p:cNvPr id="22" name="Rectangle 21">
+            <a:extLst>
+              <a:ext uri="{FF2B5EF4-FFF2-40B4-BE49-F238E27FC236}">
+                <a16:creationId xmlns:a16="http://schemas.microsoft.com/office/drawing/2014/main" id="{CF7AB69D-F306-6E89-3769-C542C2A758B4}"/>
+              </a:ext>
+            </a:extLst>
+          </p:cNvPr>
+          <p:cNvSpPr/>
+          <p:nvPr/>
+        </p:nvSpPr>
+        <p:spPr>
+          <a:xfrm>
+            <a:off x="3944082" y="2491520"/>
+            <a:ext cx="3010359" cy="721592"/>
           </a:xfrm>
           <a:prstGeom prst="rect">
             <a:avLst/>
@@ -4084,112 +4386,41 @@
           <a:bodyPr rtlCol="0" anchor="ctr"/>
           <a:lstStyle/>
           <a:p>
-            <a:pPr algn="l">
-              <a:buFont typeface="Arial" panose="020B0604020202020204" pitchFamily="34" charset="0"/>
-              <a:buChar char="•"/>
-            </a:pPr>
-            <a:r>
-              <a:rPr lang="en-US" sz="800" b="0" i="0" u="none" strike="noStrike" dirty="0">
-                <a:solidFill>
-                  <a:srgbClr val="212121"/>
-                </a:solidFill>
-                <a:effectLst/>
-                <a:latin typeface="Aptos" panose="020B0004020202020204" pitchFamily="34" charset="0"/>
-              </a:rPr>
-              <a:t>This is an email to inform you that there is 1 new CTB account which is in pending status:</a:t>
-            </a:r>
-            <a:br>
-              <a:rPr lang="en-US" sz="800" dirty="0"/>
-            </a:br>
-            <a:r>
-              <a:rPr lang="en-US" sz="800" b="0" i="0" u="none" strike="noStrike" dirty="0">
-                <a:solidFill>
-                  <a:srgbClr val="212121"/>
-                </a:solidFill>
-                <a:effectLst/>
-                <a:latin typeface="Aptos" panose="020B0004020202020204" pitchFamily="34" charset="0"/>
-              </a:rPr>
-              <a:t>User account email:</a:t>
-            </a:r>
-            <a:br>
-              <a:rPr lang="en-US" sz="800" dirty="0"/>
-            </a:br>
-            <a:r>
-              <a:rPr lang="en-US" sz="800" b="0" i="0" u="none" strike="noStrike" dirty="0">
-                <a:solidFill>
-                  <a:srgbClr val="0078D7"/>
-                </a:solidFill>
-                <a:effectLst/>
-                <a:latin typeface="Aptos" panose="020B0004020202020204" pitchFamily="34" charset="0"/>
-                <a:hlinkClick r:id="rId2"/>
-              </a:rPr>
-              <a:t>xiaoz.yao@gmail.com</a:t>
-            </a:r>
-            <a:br>
-              <a:rPr lang="en-US" sz="800" dirty="0"/>
-            </a:br>
-            <a:r>
-              <a:rPr lang="en-US" sz="800" b="0" i="0" u="none" strike="noStrike" dirty="0">
-                <a:solidFill>
-                  <a:srgbClr val="212121"/>
-                </a:solidFill>
-                <a:effectLst/>
-                <a:latin typeface="Aptos" panose="020B0004020202020204" pitchFamily="34" charset="0"/>
-              </a:rPr>
-              <a:t>Please evaluate the account above and inform the CTB Web team whether to approve or disapprove it.</a:t>
-            </a:r>
-            <a:br>
-              <a:rPr lang="en-US" sz="800" dirty="0"/>
-            </a:br>
-            <a:r>
-              <a:rPr lang="en-US" sz="800" b="0" i="0" u="none" strike="noStrike" dirty="0">
-                <a:solidFill>
-                  <a:srgbClr val="212121"/>
-                </a:solidFill>
-                <a:effectLst/>
-                <a:latin typeface="Aptos" panose="020B0004020202020204" pitchFamily="34" charset="0"/>
-              </a:rPr>
-              <a:t>A user will not be able to access the biorepository until the account is approved.</a:t>
-            </a:r>
-            <a:br>
-              <a:rPr lang="en-US" sz="800" dirty="0"/>
-            </a:br>
-            <a:r>
-              <a:rPr lang="en-US" sz="800" b="0" i="0" u="none" strike="noStrike" dirty="0">
-                <a:solidFill>
-                  <a:srgbClr val="212121"/>
-                </a:solidFill>
-                <a:effectLst/>
-                <a:latin typeface="Aptos" panose="020B0004020202020204" pitchFamily="34" charset="0"/>
-              </a:rPr>
-              <a:t>A disapproved account will be deactivated, and cannot be reused again without an admin's assistance.</a:t>
-            </a:r>
-            <a:br>
-              <a:rPr lang="en-US" sz="800" dirty="0"/>
-            </a:br>
-            <a:br>
-              <a:rPr lang="en-US" sz="800" dirty="0"/>
-            </a:br>
-            <a:r>
-              <a:rPr lang="en-US" sz="800" b="0" i="0" u="none" strike="noStrike" dirty="0">
-                <a:solidFill>
-                  <a:srgbClr val="212121"/>
-                </a:solidFill>
-                <a:effectLst/>
-                <a:latin typeface="Aptos" panose="020B0004020202020204" pitchFamily="34" charset="0"/>
-              </a:rPr>
-              <a:t>CTB Web Team</a:t>
-            </a:r>
-            <a:endParaRPr lang="en-US" sz="800" dirty="0"/>
-          </a:p>
-        </p:txBody>
-      </p:sp>
-      <p:sp>
-        <p:nvSpPr>
-          <p:cNvPr id="21" name="Rectangle 20">
-            <a:extLst>
-              <a:ext uri="{FF2B5EF4-FFF2-40B4-BE49-F238E27FC236}">
-                <a16:creationId xmlns:a16="http://schemas.microsoft.com/office/drawing/2014/main" id="{9CB710C6-BB75-01AD-41E3-C3C1F69E92B8}"/>
+            <a:pPr algn="ctr"/>
+            <a:r>
+              <a:rPr lang="en-US" sz="1200" dirty="0"/>
+              <a:t>Compare last-login to current date:</a:t>
+            </a:r>
+          </a:p>
+          <a:p>
+            <a:pPr algn="ctr"/>
+            <a:r>
+              <a:rPr lang="en-US" sz="1200" dirty="0"/>
+              <a:t>=2 second warn </a:t>
+            </a:r>
+          </a:p>
+          <a:p>
+            <a:pPr algn="ctr"/>
+            <a:r>
+              <a:rPr lang="en-US" sz="1200" dirty="0"/>
+              <a:t>=10 first warn; </a:t>
+            </a:r>
+          </a:p>
+          <a:p>
+            <a:pPr algn="ctr"/>
+            <a:r>
+              <a:rPr lang="en-US" sz="1200" dirty="0"/>
+              <a:t>=60: inactive notice</a:t>
+            </a:r>
+          </a:p>
+        </p:txBody>
+      </p:sp>
+      <p:sp>
+        <p:nvSpPr>
+          <p:cNvPr id="23" name="Rectangle 22">
+            <a:extLst>
+              <a:ext uri="{FF2B5EF4-FFF2-40B4-BE49-F238E27FC236}">
+                <a16:creationId xmlns:a16="http://schemas.microsoft.com/office/drawing/2014/main" id="{D191E5BB-F11D-320F-3131-7E3CB781F1B6}"/>
               </a:ext>
             </a:extLst>
           </p:cNvPr>
@@ -4198,8 +4429,8 @@
         </p:nvSpPr>
         <p:spPr>
           <a:xfrm>
-            <a:off x="7399855" y="5796597"/>
-            <a:ext cx="2596762" cy="630620"/>
+            <a:off x="400107" y="2491520"/>
+            <a:ext cx="3010359" cy="721592"/>
           </a:xfrm>
           <a:prstGeom prst="rect">
             <a:avLst/>
@@ -4226,23 +4457,1684 @@
             <a:pPr algn="ctr"/>
             <a:r>
               <a:rPr lang="en-US" sz="1200" dirty="0"/>
-              <a:t>Call account </a:t>
+              <a:t>Check password expiration day = </a:t>
+            </a:r>
+          </a:p>
+          <a:p>
+            <a:pPr algn="ctr"/>
+            <a:r>
+              <a:rPr lang="en-US" sz="1200" dirty="0"/>
+              <a:t>current date + 14: first warn</a:t>
+            </a:r>
+          </a:p>
+          <a:p>
+            <a:pPr algn="ctr"/>
+            <a:r>
+              <a:rPr lang="en-US" sz="1200" dirty="0"/>
+              <a:t>current date + 2: second warn</a:t>
+            </a:r>
+          </a:p>
+          <a:p>
+            <a:pPr algn="ctr"/>
+            <a:r>
+              <a:rPr lang="en-US" sz="1200" dirty="0"/>
+              <a:t>current date: expiration notice</a:t>
+            </a:r>
+          </a:p>
+        </p:txBody>
+      </p:sp>
+      <p:cxnSp>
+        <p:nvCxnSpPr>
+          <p:cNvPr id="27" name="Elbow Connector 26">
+            <a:extLst>
+              <a:ext uri="{FF2B5EF4-FFF2-40B4-BE49-F238E27FC236}">
+                <a16:creationId xmlns:a16="http://schemas.microsoft.com/office/drawing/2014/main" id="{145C753E-1F93-9FB1-BE32-DCD1A2443965}"/>
+              </a:ext>
+            </a:extLst>
+          </p:cNvPr>
+          <p:cNvCxnSpPr>
+            <a:cxnSpLocks/>
+            <a:stCxn id="12" idx="1"/>
+            <a:endCxn id="22" idx="0"/>
+          </p:cNvCxnSpPr>
+          <p:nvPr/>
+        </p:nvCxnSpPr>
+        <p:spPr>
+          <a:xfrm rot="10800000" flipV="1">
+            <a:off x="5449262" y="1981590"/>
+            <a:ext cx="1950592" cy="509930"/>
+          </a:xfrm>
+          <a:prstGeom prst="bentConnector2">
+            <a:avLst/>
+          </a:prstGeom>
+          <a:ln>
+            <a:tailEnd type="triangle"/>
+          </a:ln>
+        </p:spPr>
+        <p:style>
+          <a:lnRef idx="2">
+            <a:schemeClr val="accent1"/>
+          </a:lnRef>
+          <a:fillRef idx="0">
+            <a:schemeClr val="accent1"/>
+          </a:fillRef>
+          <a:effectRef idx="1">
+            <a:schemeClr val="accent1"/>
+          </a:effectRef>
+          <a:fontRef idx="minor">
+            <a:schemeClr val="tx1"/>
+          </a:fontRef>
+        </p:style>
+      </p:cxnSp>
+      <p:cxnSp>
+        <p:nvCxnSpPr>
+          <p:cNvPr id="29" name="Elbow Connector 28">
+            <a:extLst>
+              <a:ext uri="{FF2B5EF4-FFF2-40B4-BE49-F238E27FC236}">
+                <a16:creationId xmlns:a16="http://schemas.microsoft.com/office/drawing/2014/main" id="{CCF6998E-92A2-875F-1829-D4FC77850398}"/>
+              </a:ext>
+            </a:extLst>
+          </p:cNvPr>
+          <p:cNvCxnSpPr>
+            <a:cxnSpLocks/>
+            <a:stCxn id="12" idx="1"/>
+            <a:endCxn id="23" idx="0"/>
+          </p:cNvCxnSpPr>
+          <p:nvPr/>
+        </p:nvCxnSpPr>
+        <p:spPr>
+          <a:xfrm rot="10800000" flipV="1">
+            <a:off x="1905288" y="1981590"/>
+            <a:ext cx="5494567" cy="509930"/>
+          </a:xfrm>
+          <a:prstGeom prst="bentConnector2">
+            <a:avLst/>
+          </a:prstGeom>
+          <a:ln>
+            <a:tailEnd type="triangle"/>
+          </a:ln>
+        </p:spPr>
+        <p:style>
+          <a:lnRef idx="2">
+            <a:schemeClr val="accent1"/>
+          </a:lnRef>
+          <a:fillRef idx="0">
+            <a:schemeClr val="accent1"/>
+          </a:fillRef>
+          <a:effectRef idx="1">
+            <a:schemeClr val="accent1"/>
+          </a:effectRef>
+          <a:fontRef idx="minor">
+            <a:schemeClr val="tx1"/>
+          </a:fontRef>
+        </p:style>
+      </p:cxnSp>
+      <p:cxnSp>
+        <p:nvCxnSpPr>
+          <p:cNvPr id="37" name="Straight Arrow Connector 36">
+            <a:extLst>
+              <a:ext uri="{FF2B5EF4-FFF2-40B4-BE49-F238E27FC236}">
+                <a16:creationId xmlns:a16="http://schemas.microsoft.com/office/drawing/2014/main" id="{F901C759-3965-7399-C826-2C3EB86A98C6}"/>
+              </a:ext>
+            </a:extLst>
+          </p:cNvPr>
+          <p:cNvCxnSpPr>
+            <a:cxnSpLocks/>
+            <a:stCxn id="22" idx="2"/>
+            <a:endCxn id="19" idx="0"/>
+          </p:cNvCxnSpPr>
+          <p:nvPr/>
+        </p:nvCxnSpPr>
+        <p:spPr>
+          <a:xfrm>
+            <a:off x="5449262" y="3213112"/>
+            <a:ext cx="6178" cy="246781"/>
+          </a:xfrm>
+          <a:prstGeom prst="straightConnector1">
+            <a:avLst/>
+          </a:prstGeom>
+          <a:ln>
+            <a:tailEnd type="triangle"/>
+          </a:ln>
+        </p:spPr>
+        <p:style>
+          <a:lnRef idx="2">
+            <a:schemeClr val="accent1"/>
+          </a:lnRef>
+          <a:fillRef idx="0">
+            <a:schemeClr val="accent1"/>
+          </a:fillRef>
+          <a:effectRef idx="1">
+            <a:schemeClr val="accent1"/>
+          </a:effectRef>
+          <a:fontRef idx="minor">
+            <a:schemeClr val="tx1"/>
+          </a:fontRef>
+        </p:style>
+      </p:cxnSp>
+      <p:cxnSp>
+        <p:nvCxnSpPr>
+          <p:cNvPr id="39" name="Straight Arrow Connector 38">
+            <a:extLst>
+              <a:ext uri="{FF2B5EF4-FFF2-40B4-BE49-F238E27FC236}">
+                <a16:creationId xmlns:a16="http://schemas.microsoft.com/office/drawing/2014/main" id="{FE440B53-574D-4C0A-36B6-19802F434BE1}"/>
+              </a:ext>
+            </a:extLst>
+          </p:cNvPr>
+          <p:cNvCxnSpPr>
+            <a:cxnSpLocks/>
+            <a:stCxn id="23" idx="2"/>
+            <a:endCxn id="20" idx="0"/>
+          </p:cNvCxnSpPr>
+          <p:nvPr/>
+        </p:nvCxnSpPr>
+        <p:spPr>
+          <a:xfrm flipH="1">
+            <a:off x="1899109" y="3213112"/>
+            <a:ext cx="6178" cy="246780"/>
+          </a:xfrm>
+          <a:prstGeom prst="straightConnector1">
+            <a:avLst/>
+          </a:prstGeom>
+          <a:ln>
+            <a:tailEnd type="triangle"/>
+          </a:ln>
+        </p:spPr>
+        <p:style>
+          <a:lnRef idx="2">
+            <a:schemeClr val="accent1"/>
+          </a:lnRef>
+          <a:fillRef idx="0">
+            <a:schemeClr val="accent1"/>
+          </a:fillRef>
+          <a:effectRef idx="1">
+            <a:schemeClr val="accent1"/>
+          </a:effectRef>
+          <a:fontRef idx="minor">
+            <a:schemeClr val="tx1"/>
+          </a:fontRef>
+        </p:style>
+      </p:cxnSp>
+      <p:sp>
+        <p:nvSpPr>
+          <p:cNvPr id="55" name="Rectangle 54">
+            <a:extLst>
+              <a:ext uri="{FF2B5EF4-FFF2-40B4-BE49-F238E27FC236}">
+                <a16:creationId xmlns:a16="http://schemas.microsoft.com/office/drawing/2014/main" id="{793A8C4F-0EDA-88C1-71EB-822BF2AC9434}"/>
+              </a:ext>
+            </a:extLst>
+          </p:cNvPr>
+          <p:cNvSpPr/>
+          <p:nvPr/>
+        </p:nvSpPr>
+        <p:spPr>
+          <a:xfrm>
+            <a:off x="3944082" y="5456221"/>
+            <a:ext cx="3022715" cy="1278210"/>
+          </a:xfrm>
+          <a:prstGeom prst="rect">
+            <a:avLst/>
+          </a:prstGeom>
+          <a:ln>
+            <a:solidFill>
+              <a:srgbClr val="FF0000"/>
+            </a:solidFill>
+          </a:ln>
+        </p:spPr>
+        <p:style>
+          <a:lnRef idx="2">
+            <a:schemeClr val="accent6"/>
+          </a:lnRef>
+          <a:fillRef idx="1">
+            <a:schemeClr val="lt1"/>
+          </a:fillRef>
+          <a:effectRef idx="0">
+            <a:schemeClr val="accent6"/>
+          </a:effectRef>
+          <a:fontRef idx="minor">
+            <a:schemeClr val="dk1"/>
+          </a:fontRef>
+        </p:style>
+        <p:txBody>
+          <a:bodyPr rtlCol="0" anchor="ctr"/>
+          <a:lstStyle/>
+          <a:p>
+            <a:pPr algn="l"/>
+            <a:r>
+              <a:rPr lang="en-US" sz="800" b="0" i="0" u="none" strike="noStrike" dirty="0">
+                <a:solidFill>
+                  <a:srgbClr val="212121"/>
+                </a:solidFill>
+                <a:effectLst/>
+                <a:latin typeface="Aptos" panose="020B0004020202020204" pitchFamily="34" charset="0"/>
+              </a:rPr>
+              <a:t>Dear </a:t>
+            </a:r>
+            <a:r>
+              <a:rPr lang="en-US" sz="800" b="0" i="0" dirty="0">
+                <a:solidFill>
+                  <a:srgbClr val="0078D7"/>
+                </a:solidFill>
+                <a:effectLst/>
+                <a:latin typeface="Aptos" panose="020B0004020202020204" pitchFamily="34" charset="0"/>
+                <a:hlinkClick r:id="rId3"/>
+              </a:rPr>
+              <a:t>xiaozheng.yao@nih.gov</a:t>
+            </a:r>
+            <a:r>
+              <a:rPr lang="en-US" sz="800" b="0" i="0" u="none" strike="noStrike" dirty="0">
+                <a:solidFill>
+                  <a:srgbClr val="212121"/>
+                </a:solidFill>
+                <a:effectLst/>
+                <a:latin typeface="Aptos" panose="020B0004020202020204" pitchFamily="34" charset="0"/>
+              </a:rPr>
+              <a:t>,</a:t>
+            </a:r>
+            <a:br>
+              <a:rPr lang="en-US" sz="800" dirty="0"/>
+            </a:br>
+            <a:r>
+              <a:rPr lang="en-US" sz="800" b="0" i="0" u="none" strike="noStrike" dirty="0">
+                <a:solidFill>
+                  <a:srgbClr val="212121"/>
+                </a:solidFill>
+                <a:effectLst/>
+                <a:latin typeface="Aptos" panose="020B0004020202020204" pitchFamily="34" charset="0"/>
+              </a:rPr>
+              <a:t>Your CTB account has been deactivated due to 60 days of inactivity.</a:t>
+            </a:r>
+            <a:br>
+              <a:rPr lang="en-US" sz="800" dirty="0"/>
+            </a:br>
+            <a:r>
+              <a:rPr lang="en-US" sz="800" b="0" i="0" u="none" strike="noStrike" dirty="0">
+                <a:solidFill>
+                  <a:srgbClr val="212121"/>
+                </a:solidFill>
+                <a:effectLst/>
+                <a:latin typeface="Aptos" panose="020B0004020202020204" pitchFamily="34" charset="0"/>
+              </a:rPr>
+              <a:t>Please contact </a:t>
+            </a:r>
+            <a:r>
+              <a:rPr lang="en-US" sz="800" b="0" i="0" dirty="0">
+                <a:solidFill>
+                  <a:srgbClr val="0078D7"/>
+                </a:solidFill>
+                <a:effectLst/>
+                <a:latin typeface="Aptos" panose="020B0004020202020204" pitchFamily="34" charset="0"/>
+                <a:hlinkClick r:id="rId5"/>
+              </a:rPr>
+              <a:t>ctbWebAdmin@mail.nih.gov</a:t>
+            </a:r>
+            <a:r>
+              <a:rPr lang="en-US" sz="800" b="0" i="0" u="none" strike="noStrike" dirty="0">
+                <a:solidFill>
+                  <a:srgbClr val="212121"/>
+                </a:solidFill>
+                <a:effectLst/>
+                <a:latin typeface="Aptos" panose="020B0004020202020204" pitchFamily="34" charset="0"/>
+              </a:rPr>
+              <a:t> in order to reactivate your account.</a:t>
+            </a:r>
+            <a:br>
+              <a:rPr lang="en-US" sz="800" dirty="0"/>
+            </a:br>
+            <a:r>
+              <a:rPr lang="en-US" sz="800" b="0" i="0" u="none" strike="noStrike" dirty="0">
+                <a:solidFill>
+                  <a:srgbClr val="212121"/>
+                </a:solidFill>
+                <a:effectLst/>
+                <a:latin typeface="Aptos" panose="020B0004020202020204" pitchFamily="34" charset="0"/>
+              </a:rPr>
+              <a:t>If you would like more information regarding CTB policies on account deactivation, please contact </a:t>
+            </a:r>
+            <a:r>
+              <a:rPr lang="en-US" sz="800" b="0" i="0" dirty="0">
+                <a:solidFill>
+                  <a:srgbClr val="0078D7"/>
+                </a:solidFill>
+                <a:effectLst/>
+                <a:latin typeface="Aptos" panose="020B0004020202020204" pitchFamily="34" charset="0"/>
+                <a:hlinkClick r:id="rId5"/>
+              </a:rPr>
+              <a:t>ctbWebAdmin@mail.nih.gov</a:t>
+            </a:r>
+            <a:r>
+              <a:rPr lang="en-US" sz="800" b="0" i="0" u="none" strike="noStrike" dirty="0">
+                <a:solidFill>
+                  <a:srgbClr val="212121"/>
+                </a:solidFill>
+                <a:effectLst/>
+                <a:latin typeface="Aptos" panose="020B0004020202020204" pitchFamily="34" charset="0"/>
+              </a:rPr>
+              <a:t>.</a:t>
+            </a:r>
+            <a:br>
+              <a:rPr lang="en-US" sz="800" dirty="0"/>
+            </a:br>
+            <a:br>
+              <a:rPr lang="en-US" sz="800" dirty="0"/>
+            </a:br>
+            <a:r>
+              <a:rPr lang="en-US" sz="800" b="0" i="0" u="none" strike="noStrike" dirty="0">
+                <a:solidFill>
+                  <a:srgbClr val="212121"/>
+                </a:solidFill>
+                <a:effectLst/>
+                <a:latin typeface="Aptos" panose="020B0004020202020204" pitchFamily="34" charset="0"/>
+              </a:rPr>
+              <a:t>Sincerely, Chernobyl Tissue Bank Team</a:t>
+            </a:r>
+            <a:endParaRPr lang="en-US" sz="800" dirty="0"/>
+          </a:p>
+        </p:txBody>
+      </p:sp>
+      <p:sp>
+        <p:nvSpPr>
+          <p:cNvPr id="56" name="Rectangle 55">
+            <a:extLst>
+              <a:ext uri="{FF2B5EF4-FFF2-40B4-BE49-F238E27FC236}">
+                <a16:creationId xmlns:a16="http://schemas.microsoft.com/office/drawing/2014/main" id="{63499A2F-5E93-844C-A2B7-5CF5978C64E0}"/>
+              </a:ext>
+            </a:extLst>
+          </p:cNvPr>
+          <p:cNvSpPr/>
+          <p:nvPr/>
+        </p:nvSpPr>
+        <p:spPr>
+          <a:xfrm>
+            <a:off x="400107" y="5456220"/>
+            <a:ext cx="3022715" cy="1278211"/>
+          </a:xfrm>
+          <a:prstGeom prst="rect">
+            <a:avLst/>
+          </a:prstGeom>
+          <a:ln>
+            <a:solidFill>
+              <a:srgbClr val="FF0000"/>
+            </a:solidFill>
+          </a:ln>
+        </p:spPr>
+        <p:style>
+          <a:lnRef idx="2">
+            <a:schemeClr val="accent6"/>
+          </a:lnRef>
+          <a:fillRef idx="1">
+            <a:schemeClr val="lt1"/>
+          </a:fillRef>
+          <a:effectRef idx="0">
+            <a:schemeClr val="accent6"/>
+          </a:effectRef>
+          <a:fontRef idx="minor">
+            <a:schemeClr val="dk1"/>
+          </a:fontRef>
+        </p:style>
+        <p:txBody>
+          <a:bodyPr rtlCol="0" anchor="ctr"/>
+          <a:lstStyle/>
+          <a:p>
+            <a:pPr algn="l"/>
+            <a:r>
+              <a:rPr lang="en-US" sz="800" b="0" i="0" u="none" strike="noStrike" dirty="0">
+                <a:solidFill>
+                  <a:srgbClr val="212121"/>
+                </a:solidFill>
+                <a:effectLst/>
+                <a:latin typeface="Aptos" panose="020B0004020202020204" pitchFamily="34" charset="0"/>
+              </a:rPr>
+              <a:t>Dear </a:t>
+            </a:r>
+            <a:r>
+              <a:rPr lang="en-US" sz="800" b="0" i="0" dirty="0">
+                <a:solidFill>
+                  <a:srgbClr val="0078D7"/>
+                </a:solidFill>
+                <a:effectLst/>
+                <a:latin typeface="Aptos" panose="020B0004020202020204" pitchFamily="34" charset="0"/>
+                <a:hlinkClick r:id="rId3"/>
+              </a:rPr>
+              <a:t>xiaozheng.yao@nih.gov</a:t>
+            </a:r>
+            <a:r>
+              <a:rPr lang="en-US" sz="800" b="0" i="0" u="none" strike="noStrike" dirty="0">
+                <a:solidFill>
+                  <a:srgbClr val="212121"/>
+                </a:solidFill>
+                <a:effectLst/>
+                <a:latin typeface="Aptos" panose="020B0004020202020204" pitchFamily="34" charset="0"/>
+              </a:rPr>
+              <a:t>,</a:t>
+            </a:r>
+            <a:br>
+              <a:rPr lang="en-US" sz="800" dirty="0"/>
+            </a:br>
+            <a:r>
+              <a:rPr lang="en-US" sz="800" b="0" i="0" u="none" strike="noStrike" dirty="0">
+                <a:solidFill>
+                  <a:srgbClr val="212121"/>
+                </a:solidFill>
+                <a:effectLst/>
+                <a:latin typeface="Aptos" panose="020B0004020202020204" pitchFamily="34" charset="0"/>
+              </a:rPr>
+              <a:t>Your CTB account password has been expired.</a:t>
+            </a:r>
+            <a:br>
+              <a:rPr lang="en-US" sz="800" dirty="0"/>
+            </a:br>
+            <a:r>
+              <a:rPr lang="en-US" sz="800" b="0" i="0" u="none" strike="noStrike" dirty="0">
+                <a:solidFill>
+                  <a:srgbClr val="212121"/>
+                </a:solidFill>
+                <a:effectLst/>
+                <a:latin typeface="Aptos" panose="020B0004020202020204" pitchFamily="34" charset="0"/>
+              </a:rPr>
+              <a:t>Please visit </a:t>
+            </a:r>
+            <a:r>
+              <a:rPr lang="en-US" sz="800" b="0" i="0" dirty="0">
+                <a:solidFill>
+                  <a:srgbClr val="0078D7"/>
+                </a:solidFill>
+                <a:effectLst/>
+                <a:latin typeface="Aptos" panose="020B0004020202020204" pitchFamily="34" charset="0"/>
+                <a:hlinkClick r:id="rId4" tooltip="https://chernobyltissuebank-dev.cancer.gov/accounts/login/"/>
+              </a:rPr>
+              <a:t>our website</a:t>
+            </a:r>
+            <a:r>
+              <a:rPr lang="en-US" sz="800" b="0" i="0" u="none" strike="noStrike" dirty="0">
+                <a:solidFill>
+                  <a:srgbClr val="212121"/>
+                </a:solidFill>
+                <a:effectLst/>
+                <a:latin typeface="Aptos" panose="020B0004020202020204" pitchFamily="34" charset="0"/>
+              </a:rPr>
+              <a:t> to change your password in order to access the </a:t>
+            </a:r>
+            <a:r>
+              <a:rPr lang="en-US" sz="800" b="0" i="0" u="none" strike="noStrike" dirty="0" err="1">
+                <a:solidFill>
+                  <a:srgbClr val="212121"/>
+                </a:solidFill>
+                <a:effectLst/>
+                <a:latin typeface="Aptos" panose="020B0004020202020204" pitchFamily="34" charset="0"/>
+              </a:rPr>
+              <a:t>Biosample</a:t>
+            </a:r>
+            <a:r>
+              <a:rPr lang="en-US" sz="800" b="0" i="0" u="none" strike="noStrike" dirty="0">
+                <a:solidFill>
+                  <a:srgbClr val="212121"/>
+                </a:solidFill>
+                <a:effectLst/>
+                <a:latin typeface="Aptos" panose="020B0004020202020204" pitchFamily="34" charset="0"/>
+              </a:rPr>
+              <a:t> Search Facility.</a:t>
+            </a:r>
+            <a:br>
+              <a:rPr lang="en-US" sz="800" dirty="0"/>
+            </a:br>
+            <a:r>
+              <a:rPr lang="en-US" sz="800" b="0" i="0" u="none" strike="noStrike" dirty="0">
+                <a:solidFill>
+                  <a:srgbClr val="212121"/>
+                </a:solidFill>
+                <a:effectLst/>
+                <a:latin typeface="Aptos" panose="020B0004020202020204" pitchFamily="34" charset="0"/>
+              </a:rPr>
+              <a:t>To access this webpage you must know your username and current password.</a:t>
+            </a:r>
+            <a:br>
+              <a:rPr lang="en-US" sz="800" dirty="0"/>
+            </a:br>
+            <a:r>
+              <a:rPr lang="en-US" sz="800" b="0" i="0" u="none" strike="noStrike" dirty="0">
+                <a:solidFill>
+                  <a:srgbClr val="212121"/>
+                </a:solidFill>
+                <a:effectLst/>
+                <a:latin typeface="Aptos" panose="020B0004020202020204" pitchFamily="34" charset="0"/>
+              </a:rPr>
+              <a:t>If you need assistance, please email us at </a:t>
+            </a:r>
+            <a:r>
+              <a:rPr lang="en-US" sz="800" b="0" i="0" dirty="0">
+                <a:solidFill>
+                  <a:srgbClr val="0078D7"/>
+                </a:solidFill>
+                <a:effectLst/>
+                <a:latin typeface="Aptos" panose="020B0004020202020204" pitchFamily="34" charset="0"/>
+                <a:hlinkClick r:id="rId5"/>
+              </a:rPr>
+              <a:t>ctbWebAdmin@mail.nih.gov</a:t>
+            </a:r>
+            <a:r>
+              <a:rPr lang="en-US" sz="800" b="0" i="0" u="none" strike="noStrike" dirty="0">
+                <a:solidFill>
+                  <a:srgbClr val="212121"/>
+                </a:solidFill>
+                <a:effectLst/>
+                <a:latin typeface="Aptos" panose="020B0004020202020204" pitchFamily="34" charset="0"/>
+              </a:rPr>
+              <a:t>.</a:t>
+            </a:r>
+            <a:br>
+              <a:rPr lang="en-US" sz="800" dirty="0"/>
+            </a:br>
+            <a:r>
+              <a:rPr lang="en-US" sz="800" b="0" i="0" u="none" strike="noStrike" dirty="0">
+                <a:solidFill>
+                  <a:srgbClr val="212121"/>
+                </a:solidFill>
+                <a:effectLst/>
+                <a:latin typeface="Aptos" panose="020B0004020202020204" pitchFamily="34" charset="0"/>
+              </a:rPr>
+              <a:t>Sincerely,</a:t>
+            </a:r>
+            <a:br>
+              <a:rPr lang="en-US" sz="800" dirty="0"/>
+            </a:br>
+            <a:r>
+              <a:rPr lang="en-US" sz="800" b="0" i="0" u="none" strike="noStrike" dirty="0">
+                <a:solidFill>
+                  <a:srgbClr val="212121"/>
+                </a:solidFill>
+                <a:effectLst/>
+                <a:latin typeface="Aptos" panose="020B0004020202020204" pitchFamily="34" charset="0"/>
+              </a:rPr>
+              <a:t>Chernobyl Tissue Bank Team</a:t>
+            </a:r>
+            <a:endParaRPr lang="en-US" sz="800" dirty="0"/>
+          </a:p>
+        </p:txBody>
+      </p:sp>
+      <p:cxnSp>
+        <p:nvCxnSpPr>
+          <p:cNvPr id="59" name="Straight Arrow Connector 58">
+            <a:extLst>
+              <a:ext uri="{FF2B5EF4-FFF2-40B4-BE49-F238E27FC236}">
+                <a16:creationId xmlns:a16="http://schemas.microsoft.com/office/drawing/2014/main" id="{64D38D62-6B76-FF78-3665-AA344032EA04}"/>
+              </a:ext>
+            </a:extLst>
+          </p:cNvPr>
+          <p:cNvCxnSpPr>
+            <a:cxnSpLocks/>
+            <a:stCxn id="14" idx="2"/>
+            <a:endCxn id="21" idx="0"/>
+          </p:cNvCxnSpPr>
+          <p:nvPr/>
+        </p:nvCxnSpPr>
+        <p:spPr>
+          <a:xfrm flipH="1">
+            <a:off x="8790913" y="5209440"/>
+            <a:ext cx="6178" cy="508793"/>
+          </a:xfrm>
+          <a:prstGeom prst="straightConnector1">
+            <a:avLst/>
+          </a:prstGeom>
+          <a:ln>
+            <a:tailEnd type="triangle"/>
+          </a:ln>
+        </p:spPr>
+        <p:style>
+          <a:lnRef idx="2">
+            <a:schemeClr val="accent1"/>
+          </a:lnRef>
+          <a:fillRef idx="0">
+            <a:schemeClr val="accent1"/>
+          </a:fillRef>
+          <a:effectRef idx="1">
+            <a:schemeClr val="accent1"/>
+          </a:effectRef>
+          <a:fontRef idx="minor">
+            <a:schemeClr val="tx1"/>
+          </a:fontRef>
+        </p:style>
+      </p:cxnSp>
+      <p:cxnSp>
+        <p:nvCxnSpPr>
+          <p:cNvPr id="61" name="Straight Arrow Connector 60">
+            <a:extLst>
+              <a:ext uri="{FF2B5EF4-FFF2-40B4-BE49-F238E27FC236}">
+                <a16:creationId xmlns:a16="http://schemas.microsoft.com/office/drawing/2014/main" id="{84F5AE8F-E238-21BF-215D-2983D908D98B}"/>
+              </a:ext>
+            </a:extLst>
+          </p:cNvPr>
+          <p:cNvCxnSpPr>
+            <a:cxnSpLocks/>
+            <a:stCxn id="21" idx="3"/>
+            <a:endCxn id="17" idx="1"/>
+          </p:cNvCxnSpPr>
+          <p:nvPr/>
+        </p:nvCxnSpPr>
+        <p:spPr>
+          <a:xfrm>
+            <a:off x="10181971" y="6033543"/>
+            <a:ext cx="260061" cy="3623"/>
+          </a:xfrm>
+          <a:prstGeom prst="straightConnector1">
+            <a:avLst/>
+          </a:prstGeom>
+          <a:ln>
+            <a:tailEnd type="triangle"/>
+          </a:ln>
+        </p:spPr>
+        <p:style>
+          <a:lnRef idx="2">
+            <a:schemeClr val="accent1"/>
+          </a:lnRef>
+          <a:fillRef idx="0">
+            <a:schemeClr val="accent1"/>
+          </a:fillRef>
+          <a:effectRef idx="1">
+            <a:schemeClr val="accent1"/>
+          </a:effectRef>
+          <a:fontRef idx="minor">
+            <a:schemeClr val="tx1"/>
+          </a:fontRef>
+        </p:style>
+      </p:cxnSp>
+      <p:cxnSp>
+        <p:nvCxnSpPr>
+          <p:cNvPr id="63" name="Straight Arrow Connector 62">
+            <a:extLst>
+              <a:ext uri="{FF2B5EF4-FFF2-40B4-BE49-F238E27FC236}">
+                <a16:creationId xmlns:a16="http://schemas.microsoft.com/office/drawing/2014/main" id="{1CE7D076-8D58-B94E-4B46-2E952E0DE32A}"/>
+              </a:ext>
+            </a:extLst>
+          </p:cNvPr>
+          <p:cNvCxnSpPr>
+            <a:stCxn id="7" idx="3"/>
+            <a:endCxn id="10" idx="1"/>
+          </p:cNvCxnSpPr>
+          <p:nvPr/>
+        </p:nvCxnSpPr>
+        <p:spPr>
+          <a:xfrm>
+            <a:off x="1477766" y="1061403"/>
+            <a:ext cx="420700" cy="4688"/>
+          </a:xfrm>
+          <a:prstGeom prst="straightConnector1">
+            <a:avLst/>
+          </a:prstGeom>
+          <a:ln>
+            <a:tailEnd type="triangle"/>
+          </a:ln>
+        </p:spPr>
+        <p:style>
+          <a:lnRef idx="2">
+            <a:schemeClr val="accent1"/>
+          </a:lnRef>
+          <a:fillRef idx="0">
+            <a:schemeClr val="accent1"/>
+          </a:fillRef>
+          <a:effectRef idx="1">
+            <a:schemeClr val="accent1"/>
+          </a:effectRef>
+          <a:fontRef idx="minor">
+            <a:schemeClr val="tx1"/>
+          </a:fontRef>
+        </p:style>
+      </p:cxnSp>
+      <p:cxnSp>
+        <p:nvCxnSpPr>
+          <p:cNvPr id="65" name="Straight Arrow Connector 64">
+            <a:extLst>
+              <a:ext uri="{FF2B5EF4-FFF2-40B4-BE49-F238E27FC236}">
+                <a16:creationId xmlns:a16="http://schemas.microsoft.com/office/drawing/2014/main" id="{846B738B-839F-92DC-8C7E-44B016057D15}"/>
+              </a:ext>
+            </a:extLst>
+          </p:cNvPr>
+          <p:cNvCxnSpPr>
+            <a:stCxn id="10" idx="3"/>
+            <a:endCxn id="8" idx="1"/>
+          </p:cNvCxnSpPr>
+          <p:nvPr/>
+        </p:nvCxnSpPr>
+        <p:spPr>
+          <a:xfrm flipV="1">
+            <a:off x="3604551" y="1061403"/>
+            <a:ext cx="535820" cy="4688"/>
+          </a:xfrm>
+          <a:prstGeom prst="straightConnector1">
+            <a:avLst/>
+          </a:prstGeom>
+          <a:ln>
+            <a:tailEnd type="triangle"/>
+          </a:ln>
+        </p:spPr>
+        <p:style>
+          <a:lnRef idx="2">
+            <a:schemeClr val="accent1"/>
+          </a:lnRef>
+          <a:fillRef idx="0">
+            <a:schemeClr val="accent1"/>
+          </a:fillRef>
+          <a:effectRef idx="1">
+            <a:schemeClr val="accent1"/>
+          </a:effectRef>
+          <a:fontRef idx="minor">
+            <a:schemeClr val="tx1"/>
+          </a:fontRef>
+        </p:style>
+      </p:cxnSp>
+      <p:cxnSp>
+        <p:nvCxnSpPr>
+          <p:cNvPr id="67" name="Straight Arrow Connector 66">
+            <a:extLst>
+              <a:ext uri="{FF2B5EF4-FFF2-40B4-BE49-F238E27FC236}">
+                <a16:creationId xmlns:a16="http://schemas.microsoft.com/office/drawing/2014/main" id="{3B5C7E42-6266-B929-3EBE-60378D60BA80}"/>
+              </a:ext>
+            </a:extLst>
+          </p:cNvPr>
+          <p:cNvCxnSpPr>
+            <a:stCxn id="8" idx="3"/>
+            <a:endCxn id="9" idx="1"/>
+          </p:cNvCxnSpPr>
+          <p:nvPr/>
+        </p:nvCxnSpPr>
+        <p:spPr>
+          <a:xfrm>
+            <a:off x="5349060" y="1061403"/>
+            <a:ext cx="409048" cy="0"/>
+          </a:xfrm>
+          <a:prstGeom prst="straightConnector1">
+            <a:avLst/>
+          </a:prstGeom>
+          <a:ln>
+            <a:tailEnd type="triangle"/>
+          </a:ln>
+        </p:spPr>
+        <p:style>
+          <a:lnRef idx="2">
+            <a:schemeClr val="accent1"/>
+          </a:lnRef>
+          <a:fillRef idx="0">
+            <a:schemeClr val="accent1"/>
+          </a:fillRef>
+          <a:effectRef idx="1">
+            <a:schemeClr val="accent1"/>
+          </a:effectRef>
+          <a:fontRef idx="minor">
+            <a:schemeClr val="tx1"/>
+          </a:fontRef>
+        </p:style>
+      </p:cxnSp>
+      <p:cxnSp>
+        <p:nvCxnSpPr>
+          <p:cNvPr id="69" name="Straight Arrow Connector 68">
+            <a:extLst>
+              <a:ext uri="{FF2B5EF4-FFF2-40B4-BE49-F238E27FC236}">
+                <a16:creationId xmlns:a16="http://schemas.microsoft.com/office/drawing/2014/main" id="{AF6B7A88-FAFB-D87B-ABFE-E3881340CE24}"/>
+              </a:ext>
+            </a:extLst>
+          </p:cNvPr>
+          <p:cNvCxnSpPr>
+            <a:cxnSpLocks/>
+            <a:stCxn id="9" idx="3"/>
+            <a:endCxn id="11" idx="1"/>
+          </p:cNvCxnSpPr>
+          <p:nvPr/>
+        </p:nvCxnSpPr>
+        <p:spPr>
+          <a:xfrm>
+            <a:off x="6966797" y="1061403"/>
+            <a:ext cx="445414" cy="0"/>
+          </a:xfrm>
+          <a:prstGeom prst="straightConnector1">
+            <a:avLst/>
+          </a:prstGeom>
+          <a:ln>
+            <a:tailEnd type="triangle"/>
+          </a:ln>
+        </p:spPr>
+        <p:style>
+          <a:lnRef idx="2">
+            <a:schemeClr val="accent1"/>
+          </a:lnRef>
+          <a:fillRef idx="0">
+            <a:schemeClr val="accent1"/>
+          </a:fillRef>
+          <a:effectRef idx="1">
+            <a:schemeClr val="accent1"/>
+          </a:effectRef>
+          <a:fontRef idx="minor">
+            <a:schemeClr val="tx1"/>
+          </a:fontRef>
+        </p:style>
+      </p:cxnSp>
+      <p:cxnSp>
+        <p:nvCxnSpPr>
+          <p:cNvPr id="73" name="Straight Arrow Connector 72">
+            <a:extLst>
+              <a:ext uri="{FF2B5EF4-FFF2-40B4-BE49-F238E27FC236}">
+                <a16:creationId xmlns:a16="http://schemas.microsoft.com/office/drawing/2014/main" id="{62694FC3-17AE-3CD1-B308-178774F3A7A5}"/>
+              </a:ext>
+            </a:extLst>
+          </p:cNvPr>
+          <p:cNvCxnSpPr>
+            <a:cxnSpLocks/>
+            <a:stCxn id="11" idx="2"/>
+            <a:endCxn id="12" idx="0"/>
+          </p:cNvCxnSpPr>
+          <p:nvPr/>
+        </p:nvCxnSpPr>
+        <p:spPr>
+          <a:xfrm flipH="1">
+            <a:off x="8787910" y="1376713"/>
+            <a:ext cx="3002" cy="410969"/>
+          </a:xfrm>
+          <a:prstGeom prst="straightConnector1">
+            <a:avLst/>
+          </a:prstGeom>
+          <a:ln>
+            <a:tailEnd type="triangle"/>
+          </a:ln>
+        </p:spPr>
+        <p:style>
+          <a:lnRef idx="2">
+            <a:schemeClr val="accent1"/>
+          </a:lnRef>
+          <a:fillRef idx="0">
+            <a:schemeClr val="accent1"/>
+          </a:fillRef>
+          <a:effectRef idx="1">
+            <a:schemeClr val="accent1"/>
+          </a:effectRef>
+          <a:fontRef idx="minor">
+            <a:schemeClr val="tx1"/>
+          </a:fontRef>
+        </p:style>
+      </p:cxnSp>
+      <p:sp>
+        <p:nvSpPr>
+          <p:cNvPr id="74" name="Rectangle 73">
+            <a:extLst>
+              <a:ext uri="{FF2B5EF4-FFF2-40B4-BE49-F238E27FC236}">
+                <a16:creationId xmlns:a16="http://schemas.microsoft.com/office/drawing/2014/main" id="{27ADDF00-A586-4C9B-23A1-399E7450CD0C}"/>
+              </a:ext>
+            </a:extLst>
+          </p:cNvPr>
+          <p:cNvSpPr/>
+          <p:nvPr/>
+        </p:nvSpPr>
+        <p:spPr>
+          <a:xfrm>
+            <a:off x="10997513" y="360225"/>
+            <a:ext cx="751845" cy="385867"/>
+          </a:xfrm>
+          <a:prstGeom prst="rect">
+            <a:avLst/>
+          </a:prstGeom>
+          <a:solidFill>
+            <a:schemeClr val="accent3">
+              <a:lumMod val="40000"/>
+              <a:lumOff val="60000"/>
+            </a:schemeClr>
+          </a:solidFill>
+        </p:spPr>
+        <p:style>
+          <a:lnRef idx="2">
+            <a:schemeClr val="accent6"/>
+          </a:lnRef>
+          <a:fillRef idx="1">
+            <a:schemeClr val="lt1"/>
+          </a:fillRef>
+          <a:effectRef idx="0">
+            <a:schemeClr val="accent6"/>
+          </a:effectRef>
+          <a:fontRef idx="minor">
+            <a:schemeClr val="dk1"/>
+          </a:fontRef>
+        </p:style>
+        <p:txBody>
+          <a:bodyPr rtlCol="0" anchor="ctr"/>
+          <a:lstStyle/>
+          <a:p>
+            <a:pPr algn="ctr"/>
+            <a:r>
+              <a:rPr lang="en-US" sz="1200" dirty="0"/>
+              <a:t>CTB app trigger</a:t>
+            </a:r>
+          </a:p>
+        </p:txBody>
+      </p:sp>
+      <p:sp>
+        <p:nvSpPr>
+          <p:cNvPr id="75" name="Rectangle 74">
+            <a:extLst>
+              <a:ext uri="{FF2B5EF4-FFF2-40B4-BE49-F238E27FC236}">
+                <a16:creationId xmlns:a16="http://schemas.microsoft.com/office/drawing/2014/main" id="{0E8E696B-18FA-8C76-6FE5-0E996F9E6CCD}"/>
+              </a:ext>
+            </a:extLst>
+          </p:cNvPr>
+          <p:cNvSpPr/>
+          <p:nvPr/>
+        </p:nvSpPr>
+        <p:spPr>
+          <a:xfrm>
+            <a:off x="10997512" y="868469"/>
+            <a:ext cx="751845" cy="385867"/>
+          </a:xfrm>
+          <a:prstGeom prst="rect">
+            <a:avLst/>
+          </a:prstGeom>
+          <a:solidFill>
+            <a:schemeClr val="accent2">
+              <a:lumMod val="40000"/>
+              <a:lumOff val="60000"/>
+            </a:schemeClr>
+          </a:solidFill>
+        </p:spPr>
+        <p:style>
+          <a:lnRef idx="2">
+            <a:schemeClr val="accent6"/>
+          </a:lnRef>
+          <a:fillRef idx="1">
+            <a:schemeClr val="lt1"/>
+          </a:fillRef>
+          <a:effectRef idx="0">
+            <a:schemeClr val="accent6"/>
+          </a:effectRef>
+          <a:fontRef idx="minor">
+            <a:schemeClr val="dk1"/>
+          </a:fontRef>
+        </p:style>
+        <p:txBody>
+          <a:bodyPr rtlCol="0" anchor="ctr"/>
+          <a:lstStyle/>
+          <a:p>
+            <a:pPr algn="ctr"/>
+            <a:r>
+              <a:rPr lang="en-US" sz="1200" dirty="0"/>
+              <a:t>Cron trigger</a:t>
+            </a:r>
+          </a:p>
+        </p:txBody>
+      </p:sp>
+      <p:sp>
+        <p:nvSpPr>
+          <p:cNvPr id="76" name="Rectangle 75">
+            <a:extLst>
+              <a:ext uri="{FF2B5EF4-FFF2-40B4-BE49-F238E27FC236}">
+                <a16:creationId xmlns:a16="http://schemas.microsoft.com/office/drawing/2014/main" id="{C888E683-9504-E63D-18C6-AB5BA5DBCB0F}"/>
+              </a:ext>
+            </a:extLst>
+          </p:cNvPr>
+          <p:cNvSpPr/>
+          <p:nvPr/>
+        </p:nvSpPr>
+        <p:spPr>
+          <a:xfrm>
+            <a:off x="10997511" y="1376713"/>
+            <a:ext cx="751845" cy="385867"/>
+          </a:xfrm>
+          <a:prstGeom prst="rect">
+            <a:avLst/>
+          </a:prstGeom>
+          <a:solidFill>
+            <a:schemeClr val="tx2">
+              <a:lumMod val="25000"/>
+              <a:lumOff val="75000"/>
+            </a:schemeClr>
+          </a:solidFill>
+        </p:spPr>
+        <p:style>
+          <a:lnRef idx="2">
+            <a:schemeClr val="accent6"/>
+          </a:lnRef>
+          <a:fillRef idx="1">
+            <a:schemeClr val="lt1"/>
+          </a:fillRef>
+          <a:effectRef idx="0">
+            <a:schemeClr val="accent6"/>
+          </a:effectRef>
+          <a:fontRef idx="minor">
+            <a:schemeClr val="dk1"/>
+          </a:fontRef>
+        </p:style>
+        <p:txBody>
+          <a:bodyPr rtlCol="0" anchor="ctr"/>
+          <a:lstStyle/>
+          <a:p>
+            <a:pPr algn="ctr"/>
+            <a:r>
+              <a:rPr lang="en-US" sz="1200" dirty="0"/>
+              <a:t>Admin trigger</a:t>
+            </a:r>
+          </a:p>
+        </p:txBody>
+      </p:sp>
+      <p:cxnSp>
+        <p:nvCxnSpPr>
+          <p:cNvPr id="78" name="Elbow Connector 77">
+            <a:extLst>
+              <a:ext uri="{FF2B5EF4-FFF2-40B4-BE49-F238E27FC236}">
+                <a16:creationId xmlns:a16="http://schemas.microsoft.com/office/drawing/2014/main" id="{629741D6-FEB2-4AE7-0FC6-F982FBC5EFC8}"/>
+              </a:ext>
+            </a:extLst>
+          </p:cNvPr>
+          <p:cNvCxnSpPr>
+            <a:cxnSpLocks/>
+            <a:stCxn id="23" idx="1"/>
+            <a:endCxn id="56" idx="1"/>
+          </p:cNvCxnSpPr>
+          <p:nvPr/>
+        </p:nvCxnSpPr>
+        <p:spPr>
+          <a:xfrm rot="10800000" flipV="1">
+            <a:off x="400107" y="2852316"/>
+            <a:ext cx="12700" cy="3243010"/>
+          </a:xfrm>
+          <a:prstGeom prst="bentConnector3">
+            <a:avLst>
+              <a:gd name="adj1" fmla="val 1800000"/>
+            </a:avLst>
+          </a:prstGeom>
+          <a:ln>
+            <a:tailEnd type="triangle"/>
+          </a:ln>
+        </p:spPr>
+        <p:style>
+          <a:lnRef idx="2">
+            <a:schemeClr val="accent1"/>
+          </a:lnRef>
+          <a:fillRef idx="0">
+            <a:schemeClr val="accent1"/>
+          </a:fillRef>
+          <a:effectRef idx="1">
+            <a:schemeClr val="accent1"/>
+          </a:effectRef>
+          <a:fontRef idx="minor">
+            <a:schemeClr val="tx1"/>
+          </a:fontRef>
+        </p:style>
+      </p:cxnSp>
+      <p:cxnSp>
+        <p:nvCxnSpPr>
+          <p:cNvPr id="81" name="Elbow Connector 80">
+            <a:extLst>
+              <a:ext uri="{FF2B5EF4-FFF2-40B4-BE49-F238E27FC236}">
+                <a16:creationId xmlns:a16="http://schemas.microsoft.com/office/drawing/2014/main" id="{B2EA8E89-CD70-27BB-E200-9D43F6D78832}"/>
+              </a:ext>
+            </a:extLst>
+          </p:cNvPr>
+          <p:cNvCxnSpPr>
+            <a:cxnSpLocks/>
+          </p:cNvCxnSpPr>
+          <p:nvPr/>
+        </p:nvCxnSpPr>
+        <p:spPr>
+          <a:xfrm rot="10800000" flipV="1">
+            <a:off x="3937732" y="2852316"/>
+            <a:ext cx="12700" cy="3243010"/>
+          </a:xfrm>
+          <a:prstGeom prst="bentConnector3">
+            <a:avLst>
+              <a:gd name="adj1" fmla="val 1800000"/>
+            </a:avLst>
+          </a:prstGeom>
+          <a:ln>
+            <a:tailEnd type="triangle"/>
+          </a:ln>
+        </p:spPr>
+        <p:style>
+          <a:lnRef idx="2">
+            <a:schemeClr val="accent1"/>
+          </a:lnRef>
+          <a:fillRef idx="0">
+            <a:schemeClr val="accent1"/>
+          </a:fillRef>
+          <a:effectRef idx="1">
+            <a:schemeClr val="accent1"/>
+          </a:effectRef>
+          <a:fontRef idx="minor">
+            <a:schemeClr val="tx1"/>
+          </a:fontRef>
+        </p:style>
+      </p:cxnSp>
+      <p:sp>
+        <p:nvSpPr>
+          <p:cNvPr id="86" name="Rectangle 85">
+            <a:extLst>
+              <a:ext uri="{FF2B5EF4-FFF2-40B4-BE49-F238E27FC236}">
+                <a16:creationId xmlns:a16="http://schemas.microsoft.com/office/drawing/2014/main" id="{A0910094-F7F0-3AC5-C384-FF65441E465A}"/>
+              </a:ext>
+            </a:extLst>
+          </p:cNvPr>
+          <p:cNvSpPr/>
+          <p:nvPr/>
+        </p:nvSpPr>
+        <p:spPr>
+          <a:xfrm>
+            <a:off x="7406206" y="2487184"/>
+            <a:ext cx="2769759" cy="717969"/>
+          </a:xfrm>
+          <a:prstGeom prst="rect">
+            <a:avLst/>
+          </a:prstGeom>
+        </p:spPr>
+        <p:style>
+          <a:lnRef idx="2">
+            <a:schemeClr val="accent6"/>
+          </a:lnRef>
+          <a:fillRef idx="1">
+            <a:schemeClr val="lt1"/>
+          </a:fillRef>
+          <a:effectRef idx="0">
+            <a:schemeClr val="accent6"/>
+          </a:effectRef>
+          <a:fontRef idx="minor">
+            <a:schemeClr val="dk1"/>
+          </a:fontRef>
+        </p:style>
+        <p:txBody>
+          <a:bodyPr rtlCol="0" anchor="ctr"/>
+          <a:lstStyle/>
+          <a:p>
+            <a:pPr algn="ctr"/>
+            <a:r>
+              <a:rPr lang="en-US" sz="1200" dirty="0"/>
+              <a:t>check pending account: If verified=1 but </a:t>
             </a:r>
             <a:r>
               <a:rPr lang="en-US" sz="1200" dirty="0" err="1"/>
-              <a:t>approval_stat</a:t>
+              <a:t>auth_user_groups</a:t>
             </a:r>
             <a:r>
               <a:rPr lang="en-US" sz="1200" dirty="0"/>
-              <a:t> to approve or not</a:t>
-            </a:r>
-          </a:p>
-        </p:txBody>
-      </p:sp>
+              <a:t> does not have this user id</a:t>
+            </a:r>
+          </a:p>
+          <a:p>
+            <a:pPr algn="ctr"/>
+            <a:r>
+              <a:rPr lang="en-US" sz="1200" dirty="0"/>
+              <a:t>trigger notification email</a:t>
+            </a:r>
+          </a:p>
+        </p:txBody>
+      </p:sp>
+      <p:cxnSp>
+        <p:nvCxnSpPr>
+          <p:cNvPr id="92" name="Straight Arrow Connector 91">
+            <a:extLst>
+              <a:ext uri="{FF2B5EF4-FFF2-40B4-BE49-F238E27FC236}">
+                <a16:creationId xmlns:a16="http://schemas.microsoft.com/office/drawing/2014/main" id="{7363DE59-A745-CE1E-D6C1-92481FC955EC}"/>
+              </a:ext>
+            </a:extLst>
+          </p:cNvPr>
+          <p:cNvCxnSpPr>
+            <a:cxnSpLocks/>
+            <a:stCxn id="12" idx="2"/>
+            <a:endCxn id="86" idx="0"/>
+          </p:cNvCxnSpPr>
+          <p:nvPr/>
+        </p:nvCxnSpPr>
+        <p:spPr>
+          <a:xfrm>
+            <a:off x="8787910" y="2175498"/>
+            <a:ext cx="3176" cy="311686"/>
+          </a:xfrm>
+          <a:prstGeom prst="straightConnector1">
+            <a:avLst/>
+          </a:prstGeom>
+          <a:ln>
+            <a:tailEnd type="triangle"/>
+          </a:ln>
+        </p:spPr>
+        <p:style>
+          <a:lnRef idx="2">
+            <a:schemeClr val="accent1"/>
+          </a:lnRef>
+          <a:fillRef idx="0">
+            <a:schemeClr val="accent1"/>
+          </a:fillRef>
+          <a:effectRef idx="1">
+            <a:schemeClr val="accent1"/>
+          </a:effectRef>
+          <a:fontRef idx="minor">
+            <a:schemeClr val="tx1"/>
+          </a:fontRef>
+        </p:style>
+      </p:cxnSp>
+      <p:cxnSp>
+        <p:nvCxnSpPr>
+          <p:cNvPr id="94" name="Straight Arrow Connector 93">
+            <a:extLst>
+              <a:ext uri="{FF2B5EF4-FFF2-40B4-BE49-F238E27FC236}">
+                <a16:creationId xmlns:a16="http://schemas.microsoft.com/office/drawing/2014/main" id="{A3C2268E-AB3B-E744-0DC4-80DF584A5E89}"/>
+              </a:ext>
+            </a:extLst>
+          </p:cNvPr>
+          <p:cNvCxnSpPr>
+            <a:cxnSpLocks/>
+            <a:stCxn id="86" idx="2"/>
+            <a:endCxn id="14" idx="0"/>
+          </p:cNvCxnSpPr>
+          <p:nvPr/>
+        </p:nvCxnSpPr>
+        <p:spPr>
+          <a:xfrm>
+            <a:off x="8791086" y="3205153"/>
+            <a:ext cx="6005" cy="254739"/>
+          </a:xfrm>
+          <a:prstGeom prst="straightConnector1">
+            <a:avLst/>
+          </a:prstGeom>
+          <a:ln>
+            <a:tailEnd type="triangle"/>
+          </a:ln>
+        </p:spPr>
+        <p:style>
+          <a:lnRef idx="2">
+            <a:schemeClr val="accent1"/>
+          </a:lnRef>
+          <a:fillRef idx="0">
+            <a:schemeClr val="accent1"/>
+          </a:fillRef>
+          <a:effectRef idx="1">
+            <a:schemeClr val="accent1"/>
+          </a:effectRef>
+          <a:fontRef idx="minor">
+            <a:schemeClr val="tx1"/>
+          </a:fontRef>
+        </p:style>
+      </p:cxnSp>
     </p:spTree>
     <p:extLst>
       <p:ext uri="{BB962C8B-B14F-4D97-AF65-F5344CB8AC3E}">
         <p14:creationId xmlns:p14="http://schemas.microsoft.com/office/powerpoint/2010/main" val="2080552675"/>
+      </p:ext>
+    </p:extLst>
+  </p:cSld>
+  <p:clrMapOvr>
+    <a:masterClrMapping/>
+  </p:clrMapOvr>
+</p:sld>
+</file>
+
+<file path=ppt/slides/slide2.xml><?xml version="1.0" encoding="utf-8"?>
+<p:sld xmlns:a="http://schemas.openxmlformats.org/drawingml/2006/main" xmlns:r="http://schemas.openxmlformats.org/officeDocument/2006/relationships" xmlns:p="http://schemas.openxmlformats.org/presentationml/2006/main">
+  <p:cSld>
+    <p:spTree>
+      <p:nvGrpSpPr>
+        <p:cNvPr id="1" name=""/>
+        <p:cNvGrpSpPr/>
+        <p:nvPr/>
+      </p:nvGrpSpPr>
+      <p:grpSpPr>
+        <a:xfrm>
+          <a:off x="0" y="0"/>
+          <a:ext cx="0" cy="0"/>
+          <a:chOff x="0" y="0"/>
+          <a:chExt cx="0" cy="0"/>
+        </a:xfrm>
+      </p:grpSpPr>
+      <p:pic>
+        <p:nvPicPr>
+          <p:cNvPr id="5" name="Picture 4">
+            <a:extLst>
+              <a:ext uri="{FF2B5EF4-FFF2-40B4-BE49-F238E27FC236}">
+                <a16:creationId xmlns:a16="http://schemas.microsoft.com/office/drawing/2014/main" id="{577718EB-0C79-1212-055E-978BB0B7538A}"/>
+              </a:ext>
+            </a:extLst>
+          </p:cNvPr>
+          <p:cNvPicPr>
+            <a:picLocks noChangeAspect="1"/>
+          </p:cNvPicPr>
+          <p:nvPr/>
+        </p:nvPicPr>
+        <p:blipFill>
+          <a:blip r:embed="rId2"/>
+          <a:stretch>
+            <a:fillRect/>
+          </a:stretch>
+        </p:blipFill>
+        <p:spPr>
+          <a:xfrm>
+            <a:off x="832022" y="1165997"/>
+            <a:ext cx="3708400" cy="3263900"/>
+          </a:xfrm>
+          <a:prstGeom prst="rect">
+            <a:avLst/>
+          </a:prstGeom>
+        </p:spPr>
+      </p:pic>
+      <p:pic>
+        <p:nvPicPr>
+          <p:cNvPr id="7" name="Picture 6">
+            <a:extLst>
+              <a:ext uri="{FF2B5EF4-FFF2-40B4-BE49-F238E27FC236}">
+                <a16:creationId xmlns:a16="http://schemas.microsoft.com/office/drawing/2014/main" id="{19406720-49DB-3E2E-D8BA-2F34EFBC9276}"/>
+              </a:ext>
+            </a:extLst>
+          </p:cNvPr>
+          <p:cNvPicPr>
+            <a:picLocks noChangeAspect="1"/>
+          </p:cNvPicPr>
+          <p:nvPr/>
+        </p:nvPicPr>
+        <p:blipFill>
+          <a:blip r:embed="rId3"/>
+          <a:stretch>
+            <a:fillRect/>
+          </a:stretch>
+        </p:blipFill>
+        <p:spPr>
+          <a:xfrm>
+            <a:off x="5577965" y="1078446"/>
+            <a:ext cx="4147229" cy="3351451"/>
+          </a:xfrm>
+          <a:prstGeom prst="rect">
+            <a:avLst/>
+          </a:prstGeom>
+        </p:spPr>
+      </p:pic>
+      <p:sp>
+        <p:nvSpPr>
+          <p:cNvPr id="9" name="TextBox 8">
+            <a:extLst>
+              <a:ext uri="{FF2B5EF4-FFF2-40B4-BE49-F238E27FC236}">
+                <a16:creationId xmlns:a16="http://schemas.microsoft.com/office/drawing/2014/main" id="{7C71BBB0-D4AF-90AD-8A49-AD8A8FCB20FE}"/>
+              </a:ext>
+            </a:extLst>
+          </p:cNvPr>
+          <p:cNvSpPr txBox="1"/>
+          <p:nvPr/>
+        </p:nvSpPr>
+        <p:spPr>
+          <a:xfrm>
+            <a:off x="5224246" y="5117411"/>
+            <a:ext cx="4500948" cy="461665"/>
+          </a:xfrm>
+          <a:prstGeom prst="rect">
+            <a:avLst/>
+          </a:prstGeom>
+          <a:solidFill>
+            <a:schemeClr val="tx2">
+              <a:lumMod val="25000"/>
+              <a:lumOff val="75000"/>
+            </a:schemeClr>
+          </a:solidFill>
+        </p:spPr>
+        <p:style>
+          <a:lnRef idx="2">
+            <a:schemeClr val="accent6"/>
+          </a:lnRef>
+          <a:fillRef idx="1">
+            <a:schemeClr val="lt1"/>
+          </a:fillRef>
+          <a:effectRef idx="0">
+            <a:schemeClr val="accent6"/>
+          </a:effectRef>
+          <a:fontRef idx="minor">
+            <a:schemeClr val="dk1"/>
+          </a:fontRef>
+        </p:style>
+        <p:txBody>
+          <a:bodyPr rtlCol="0" anchor="ctr"/>
+          <a:lstStyle>
+            <a:defPPr>
+              <a:defRPr lang="en-US"/>
+            </a:defPPr>
+            <a:lvl1pPr algn="ctr">
+              <a:defRPr sz="1200">
+                <a:solidFill>
+                  <a:schemeClr val="dk1"/>
+                </a:solidFill>
+              </a:defRPr>
+            </a:lvl1pPr>
+            <a:lvl2pPr>
+              <a:defRPr>
+                <a:solidFill>
+                  <a:schemeClr val="dk1"/>
+                </a:solidFill>
+              </a:defRPr>
+            </a:lvl2pPr>
+            <a:lvl3pPr>
+              <a:defRPr>
+                <a:solidFill>
+                  <a:schemeClr val="dk1"/>
+                </a:solidFill>
+              </a:defRPr>
+            </a:lvl3pPr>
+            <a:lvl4pPr>
+              <a:defRPr>
+                <a:solidFill>
+                  <a:schemeClr val="dk1"/>
+                </a:solidFill>
+              </a:defRPr>
+            </a:lvl4pPr>
+            <a:lvl5pPr>
+              <a:defRPr>
+                <a:solidFill>
+                  <a:schemeClr val="dk1"/>
+                </a:solidFill>
+              </a:defRPr>
+            </a:lvl5pPr>
+            <a:lvl6pPr>
+              <a:defRPr>
+                <a:solidFill>
+                  <a:schemeClr val="dk1"/>
+                </a:solidFill>
+              </a:defRPr>
+            </a:lvl6pPr>
+            <a:lvl7pPr>
+              <a:defRPr>
+                <a:solidFill>
+                  <a:schemeClr val="dk1"/>
+                </a:solidFill>
+              </a:defRPr>
+            </a:lvl7pPr>
+            <a:lvl8pPr>
+              <a:defRPr>
+                <a:solidFill>
+                  <a:schemeClr val="dk1"/>
+                </a:solidFill>
+              </a:defRPr>
+            </a:lvl8pPr>
+            <a:lvl9pPr>
+              <a:defRPr>
+                <a:solidFill>
+                  <a:schemeClr val="dk1"/>
+                </a:solidFill>
+              </a:defRPr>
+            </a:lvl9pPr>
+          </a:lstStyle>
+          <a:p>
+            <a:r>
+              <a:rPr lang="en-US" dirty="0"/>
+              <a:t>UPDATE </a:t>
+            </a:r>
+            <a:r>
+              <a:rPr lang="en-US" dirty="0" err="1"/>
+              <a:t>auth_user</a:t>
+            </a:r>
+            <a:r>
+              <a:rPr lang="en-US" dirty="0"/>
+              <a:t> SET </a:t>
+            </a:r>
+            <a:r>
+              <a:rPr lang="en-US" dirty="0" err="1"/>
+              <a:t>last_login</a:t>
+            </a:r>
+            <a:r>
+              <a:rPr lang="en-US" dirty="0"/>
+              <a:t> = CURRENT_TIMESTAMP(6), </a:t>
+            </a:r>
+            <a:r>
+              <a:rPr lang="en-US" dirty="0" err="1"/>
+              <a:t>is_active</a:t>
+            </a:r>
+            <a:r>
+              <a:rPr lang="en-US" dirty="0"/>
+              <a:t> = 1 WHERE username = ”</a:t>
+            </a:r>
+            <a:r>
+              <a:rPr lang="en-US" dirty="0" err="1"/>
+              <a:t>xiaozheng.yao</a:t>
+            </a:r>
+            <a:r>
+              <a:rPr lang="en-US" dirty="0"/>
+              <a:t>";</a:t>
+            </a:r>
+          </a:p>
+        </p:txBody>
+      </p:sp>
+      <p:sp>
+        <p:nvSpPr>
+          <p:cNvPr id="10" name="Rectangle 9">
+            <a:extLst>
+              <a:ext uri="{FF2B5EF4-FFF2-40B4-BE49-F238E27FC236}">
+                <a16:creationId xmlns:a16="http://schemas.microsoft.com/office/drawing/2014/main" id="{99CF20E3-5387-2C33-8508-0E820E6B2AAA}"/>
+              </a:ext>
+            </a:extLst>
+          </p:cNvPr>
+          <p:cNvSpPr/>
+          <p:nvPr/>
+        </p:nvSpPr>
+        <p:spPr>
+          <a:xfrm>
+            <a:off x="1405899" y="313606"/>
+            <a:ext cx="2288771" cy="630620"/>
+          </a:xfrm>
+          <a:prstGeom prst="rect">
+            <a:avLst/>
+          </a:prstGeom>
+          <a:ln>
+            <a:solidFill>
+              <a:srgbClr val="FF0000"/>
+            </a:solidFill>
+          </a:ln>
+        </p:spPr>
+        <p:style>
+          <a:lnRef idx="2">
+            <a:schemeClr val="accent6"/>
+          </a:lnRef>
+          <a:fillRef idx="1">
+            <a:schemeClr val="lt1"/>
+          </a:fillRef>
+          <a:effectRef idx="0">
+            <a:schemeClr val="accent6"/>
+          </a:effectRef>
+          <a:fontRef idx="minor">
+            <a:schemeClr val="dk1"/>
+          </a:fontRef>
+        </p:style>
+        <p:txBody>
+          <a:bodyPr rtlCol="0" anchor="ctr"/>
+          <a:lstStyle/>
+          <a:p>
+            <a:pPr algn="ctr"/>
+            <a:r>
+              <a:rPr lang="en-US" sz="1400" dirty="0"/>
+              <a:t>If password expire, when user login with old password:</a:t>
+            </a:r>
+          </a:p>
+        </p:txBody>
+      </p:sp>
+      <p:sp>
+        <p:nvSpPr>
+          <p:cNvPr id="11" name="Rectangle 10">
+            <a:extLst>
+              <a:ext uri="{FF2B5EF4-FFF2-40B4-BE49-F238E27FC236}">
+                <a16:creationId xmlns:a16="http://schemas.microsoft.com/office/drawing/2014/main" id="{B2AA4EF2-DA00-0954-E5E9-BABD6390E927}"/>
+              </a:ext>
+            </a:extLst>
+          </p:cNvPr>
+          <p:cNvSpPr/>
+          <p:nvPr/>
+        </p:nvSpPr>
+        <p:spPr>
+          <a:xfrm>
+            <a:off x="6096000" y="313606"/>
+            <a:ext cx="2288771" cy="630620"/>
+          </a:xfrm>
+          <a:prstGeom prst="rect">
+            <a:avLst/>
+          </a:prstGeom>
+          <a:ln>
+            <a:solidFill>
+              <a:srgbClr val="FF0000"/>
+            </a:solidFill>
+          </a:ln>
+        </p:spPr>
+        <p:style>
+          <a:lnRef idx="2">
+            <a:schemeClr val="accent6"/>
+          </a:lnRef>
+          <a:fillRef idx="1">
+            <a:schemeClr val="lt1"/>
+          </a:fillRef>
+          <a:effectRef idx="0">
+            <a:schemeClr val="accent6"/>
+          </a:effectRef>
+          <a:fontRef idx="minor">
+            <a:schemeClr val="dk1"/>
+          </a:fontRef>
+        </p:style>
+        <p:txBody>
+          <a:bodyPr rtlCol="0" anchor="ctr"/>
+          <a:lstStyle/>
+          <a:p>
+            <a:pPr algn="ctr"/>
+            <a:r>
+              <a:rPr lang="en-US" sz="1400" dirty="0"/>
+              <a:t>If account inactivated, when user login with password:</a:t>
+            </a:r>
+          </a:p>
+        </p:txBody>
+      </p:sp>
+      <p:sp>
+        <p:nvSpPr>
+          <p:cNvPr id="12" name="TextBox 11">
+            <a:extLst>
+              <a:ext uri="{FF2B5EF4-FFF2-40B4-BE49-F238E27FC236}">
+                <a16:creationId xmlns:a16="http://schemas.microsoft.com/office/drawing/2014/main" id="{B369E993-D92E-3748-84FC-EC43D8F4B853}"/>
+              </a:ext>
+            </a:extLst>
+          </p:cNvPr>
+          <p:cNvSpPr txBox="1"/>
+          <p:nvPr/>
+        </p:nvSpPr>
+        <p:spPr>
+          <a:xfrm>
+            <a:off x="5303197" y="4397300"/>
+            <a:ext cx="4433137" cy="523220"/>
+          </a:xfrm>
+          <a:prstGeom prst="rect">
+            <a:avLst/>
+          </a:prstGeom>
+          <a:noFill/>
+        </p:spPr>
+        <p:txBody>
+          <a:bodyPr wrap="none" rtlCol="0">
+            <a:spAutoFit/>
+          </a:bodyPr>
+          <a:lstStyle/>
+          <a:p>
+            <a:r>
+              <a:rPr lang="en-US" sz="1400" dirty="0"/>
+              <a:t>Admin need to run this command to activate account. </a:t>
+            </a:r>
+          </a:p>
+          <a:p>
+            <a:r>
+              <a:rPr lang="en-US" sz="1400" dirty="0"/>
+              <a:t>After activated user can use previous password to login</a:t>
+            </a:r>
+          </a:p>
+        </p:txBody>
+      </p:sp>
+    </p:spTree>
+    <p:extLst>
+      <p:ext uri="{BB962C8B-B14F-4D97-AF65-F5344CB8AC3E}">
+        <p14:creationId xmlns:p14="http://schemas.microsoft.com/office/powerpoint/2010/main" val="3531607769"/>
       </p:ext>
     </p:extLst>
   </p:cSld>

</xml_diff>